<commit_message>
prepping for Sp 2026 semester
</commit_message>
<xml_diff>
--- a/slides/00-CourseIntroduction.pptx
+++ b/slides/00-CourseIntroduction.pptx
@@ -221,7 +221,7 @@
           <a:p>
             <a:fld id="{C5B45307-6ED4-B142-BD64-10F739779302}" type="datetimeFigureOut">
               <a:rPr lang="en-US" smtClean="0"/>
-              <a:t>1/13/25</a:t>
+              <a:t>1/9/26</a:t>
             </a:fld>
             <a:endParaRPr lang="en-US"/>
           </a:p>
@@ -629,7 +629,7 @@
           <a:noFill/>
           <a:extLst>
             <a:ext uri="{909E8E84-426E-40dd-AFC4-6F175D3DCCD1}">
-              <a14:hiddenFill xmlns="" xmlns:a14="http://schemas.microsoft.com/office/drawing/2010/main">
+              <a14:hiddenFill xmlns:a14="http://schemas.microsoft.com/office/drawing/2010/main" xmlns="">
                 <a:solidFill>
                   <a:srgbClr val="FFFFFF"/>
                 </a:solidFill>
@@ -688,7 +688,7 @@
             </a:ln>
             <a:extLst>
               <a:ext uri="{91240B29-F687-4f45-9708-019B960494DF}">
-                <a14:hiddenLine xmlns="" xmlns:a14="http://schemas.microsoft.com/office/drawing/2010/main" w="9525">
+                <a14:hiddenLine xmlns:a14="http://schemas.microsoft.com/office/drawing/2010/main" xmlns="" w="9525">
                   <a:solidFill>
                     <a:srgbClr val="000000"/>
                   </a:solidFill>
@@ -778,7 +778,7 @@
             </a:ln>
             <a:extLst>
               <a:ext uri="{91240B29-F687-4f45-9708-019B960494DF}">
-                <a14:hiddenLine xmlns="" xmlns:a14="http://schemas.microsoft.com/office/drawing/2010/main" w="9525">
+                <a14:hiddenLine xmlns:a14="http://schemas.microsoft.com/office/drawing/2010/main" xmlns="" w="9525">
                   <a:solidFill>
                     <a:srgbClr val="000000"/>
                   </a:solidFill>
@@ -868,7 +868,7 @@
             </a:ln>
             <a:extLst>
               <a:ext uri="{91240B29-F687-4f45-9708-019B960494DF}">
-                <a14:hiddenLine xmlns="" xmlns:a14="http://schemas.microsoft.com/office/drawing/2010/main" w="9525">
+                <a14:hiddenLine xmlns:a14="http://schemas.microsoft.com/office/drawing/2010/main" xmlns="" w="9525">
                   <a:solidFill>
                     <a:srgbClr val="000000"/>
                   </a:solidFill>
@@ -902,7 +902,7 @@
             </a:ln>
             <a:extLst>
               <a:ext uri="{91240B29-F687-4f45-9708-019B960494DF}">
-                <a14:hiddenLine xmlns="" xmlns:a14="http://schemas.microsoft.com/office/drawing/2010/main" w="9525">
+                <a14:hiddenLine xmlns:a14="http://schemas.microsoft.com/office/drawing/2010/main" xmlns="" w="9525">
                   <a:solidFill>
                     <a:srgbClr val="000000"/>
                   </a:solidFill>
@@ -992,7 +992,7 @@
             </a:ln>
             <a:extLst>
               <a:ext uri="{91240B29-F687-4f45-9708-019B960494DF}">
-                <a14:hiddenLine xmlns="" xmlns:a14="http://schemas.microsoft.com/office/drawing/2010/main" w="9525">
+                <a14:hiddenLine xmlns:a14="http://schemas.microsoft.com/office/drawing/2010/main" xmlns="" w="9525">
                   <a:solidFill>
                     <a:srgbClr val="000000"/>
                   </a:solidFill>
@@ -1054,7 +1054,7 @@
             </a:ln>
             <a:extLst>
               <a:ext uri="{91240B29-F687-4f45-9708-019B960494DF}">
-                <a14:hiddenLine xmlns="" xmlns:a14="http://schemas.microsoft.com/office/drawing/2010/main" w="9525">
+                <a14:hiddenLine xmlns:a14="http://schemas.microsoft.com/office/drawing/2010/main" xmlns="" w="9525">
                   <a:solidFill>
                     <a:srgbClr val="000000"/>
                   </a:solidFill>
@@ -1116,7 +1116,7 @@
             </a:ln>
             <a:extLst>
               <a:ext uri="{91240B29-F687-4f45-9708-019B960494DF}">
-                <a14:hiddenLine xmlns="" xmlns:a14="http://schemas.microsoft.com/office/drawing/2010/main" w="9525">
+                <a14:hiddenLine xmlns:a14="http://schemas.microsoft.com/office/drawing/2010/main" xmlns="" w="9525">
                   <a:solidFill>
                     <a:srgbClr val="000000"/>
                   </a:solidFill>
@@ -1206,7 +1206,7 @@
             </a:ln>
             <a:extLst>
               <a:ext uri="{91240B29-F687-4f45-9708-019B960494DF}">
-                <a14:hiddenLine xmlns="" xmlns:a14="http://schemas.microsoft.com/office/drawing/2010/main" w="9525">
+                <a14:hiddenLine xmlns:a14="http://schemas.microsoft.com/office/drawing/2010/main" xmlns="" w="9525">
                   <a:solidFill>
                     <a:srgbClr val="000000"/>
                   </a:solidFill>
@@ -1268,7 +1268,7 @@
             </a:ln>
             <a:extLst>
               <a:ext uri="{91240B29-F687-4f45-9708-019B960494DF}">
-                <a14:hiddenLine xmlns="" xmlns:a14="http://schemas.microsoft.com/office/drawing/2010/main" w="9525">
+                <a14:hiddenLine xmlns:a14="http://schemas.microsoft.com/office/drawing/2010/main" xmlns="" w="9525">
                   <a:solidFill>
                     <a:srgbClr val="000000"/>
                   </a:solidFill>
@@ -1330,7 +1330,7 @@
             </a:ln>
             <a:extLst>
               <a:ext uri="{91240B29-F687-4f45-9708-019B960494DF}">
-                <a14:hiddenLine xmlns="" xmlns:a14="http://schemas.microsoft.com/office/drawing/2010/main" w="9525">
+                <a14:hiddenLine xmlns:a14="http://schemas.microsoft.com/office/drawing/2010/main" xmlns="" w="9525">
                   <a:solidFill>
                     <a:srgbClr val="000000"/>
                   </a:solidFill>
@@ -1420,7 +1420,7 @@
             </a:ln>
             <a:extLst>
               <a:ext uri="{91240B29-F687-4f45-9708-019B960494DF}">
-                <a14:hiddenLine xmlns="" xmlns:a14="http://schemas.microsoft.com/office/drawing/2010/main" w="9525">
+                <a14:hiddenLine xmlns:a14="http://schemas.microsoft.com/office/drawing/2010/main" xmlns="" w="9525">
                   <a:solidFill>
                     <a:srgbClr val="000000"/>
                   </a:solidFill>
@@ -1510,7 +1510,7 @@
             </a:ln>
             <a:extLst>
               <a:ext uri="{91240B29-F687-4f45-9708-019B960494DF}">
-                <a14:hiddenLine xmlns="" xmlns:a14="http://schemas.microsoft.com/office/drawing/2010/main" w="9525">
+                <a14:hiddenLine xmlns:a14="http://schemas.microsoft.com/office/drawing/2010/main" xmlns="" w="9525">
                   <a:solidFill>
                     <a:srgbClr val="000000"/>
                   </a:solidFill>
@@ -1572,7 +1572,7 @@
             </a:ln>
             <a:extLst>
               <a:ext uri="{91240B29-F687-4f45-9708-019B960494DF}">
-                <a14:hiddenLine xmlns="" xmlns:a14="http://schemas.microsoft.com/office/drawing/2010/main" w="9525">
+                <a14:hiddenLine xmlns:a14="http://schemas.microsoft.com/office/drawing/2010/main" xmlns="" w="9525">
                   <a:solidFill>
                     <a:srgbClr val="000000"/>
                   </a:solidFill>
@@ -1682,7 +1682,7 @@
             </a:ln>
             <a:extLst>
               <a:ext uri="{91240B29-F687-4f45-9708-019B960494DF}">
-                <a14:hiddenLine xmlns="" xmlns:a14="http://schemas.microsoft.com/office/drawing/2010/main" w="9525">
+                <a14:hiddenLine xmlns:a14="http://schemas.microsoft.com/office/drawing/2010/main" xmlns="" w="9525">
                   <a:solidFill>
                     <a:srgbClr val="000000"/>
                   </a:solidFill>
@@ -1744,7 +1744,7 @@
             </a:ln>
             <a:extLst>
               <a:ext uri="{91240B29-F687-4f45-9708-019B960494DF}">
-                <a14:hiddenLine xmlns="" xmlns:a14="http://schemas.microsoft.com/office/drawing/2010/main" w="9525">
+                <a14:hiddenLine xmlns:a14="http://schemas.microsoft.com/office/drawing/2010/main" xmlns="" w="9525">
                   <a:solidFill>
                     <a:srgbClr val="000000"/>
                   </a:solidFill>
@@ -1834,7 +1834,7 @@
             </a:ln>
             <a:extLst>
               <a:ext uri="{91240B29-F687-4f45-9708-019B960494DF}">
-                <a14:hiddenLine xmlns="" xmlns:a14="http://schemas.microsoft.com/office/drawing/2010/main" w="9525">
+                <a14:hiddenLine xmlns:a14="http://schemas.microsoft.com/office/drawing/2010/main" xmlns="" w="9525">
                   <a:solidFill>
                     <a:srgbClr val="000000"/>
                   </a:solidFill>
@@ -1924,7 +1924,7 @@
             </a:ln>
             <a:extLst>
               <a:ext uri="{91240B29-F687-4f45-9708-019B960494DF}">
-                <a14:hiddenLine xmlns="" xmlns:a14="http://schemas.microsoft.com/office/drawing/2010/main" w="9525">
+                <a14:hiddenLine xmlns:a14="http://schemas.microsoft.com/office/drawing/2010/main" xmlns="" w="9525">
                   <a:solidFill>
                     <a:srgbClr val="000000"/>
                   </a:solidFill>
@@ -1986,7 +1986,7 @@
             </a:ln>
             <a:extLst>
               <a:ext uri="{91240B29-F687-4f45-9708-019B960494DF}">
-                <a14:hiddenLine xmlns="" xmlns:a14="http://schemas.microsoft.com/office/drawing/2010/main" w="9525">
+                <a14:hiddenLine xmlns:a14="http://schemas.microsoft.com/office/drawing/2010/main" xmlns="" w="9525">
                   <a:solidFill>
                     <a:srgbClr val="000000"/>
                   </a:solidFill>
@@ -2076,7 +2076,7 @@
             </a:ln>
             <a:extLst>
               <a:ext uri="{91240B29-F687-4f45-9708-019B960494DF}">
-                <a14:hiddenLine xmlns="" xmlns:a14="http://schemas.microsoft.com/office/drawing/2010/main" w="9525">
+                <a14:hiddenLine xmlns:a14="http://schemas.microsoft.com/office/drawing/2010/main" xmlns="" w="9525">
                   <a:solidFill>
                     <a:srgbClr val="000000"/>
                   </a:solidFill>
@@ -2166,7 +2166,7 @@
             </a:ln>
             <a:extLst>
               <a:ext uri="{91240B29-F687-4f45-9708-019B960494DF}">
-                <a14:hiddenLine xmlns="" xmlns:a14="http://schemas.microsoft.com/office/drawing/2010/main" w="9525">
+                <a14:hiddenLine xmlns:a14="http://schemas.microsoft.com/office/drawing/2010/main" xmlns="" w="9525">
                   <a:solidFill>
                     <a:srgbClr val="000000"/>
                   </a:solidFill>
@@ -2222,7 +2222,7 @@
             </a:ln>
             <a:extLst>
               <a:ext uri="{91240B29-F687-4f45-9708-019B960494DF}">
-                <a14:hiddenLine xmlns="" xmlns:a14="http://schemas.microsoft.com/office/drawing/2010/main" w="9525">
+                <a14:hiddenLine xmlns:a14="http://schemas.microsoft.com/office/drawing/2010/main" xmlns="" w="9525">
                   <a:solidFill>
                     <a:srgbClr val="000000"/>
                   </a:solidFill>
@@ -2312,7 +2312,7 @@
             </a:ln>
             <a:extLst>
               <a:ext uri="{91240B29-F687-4f45-9708-019B960494DF}">
-                <a14:hiddenLine xmlns="" xmlns:a14="http://schemas.microsoft.com/office/drawing/2010/main" w="9525">
+                <a14:hiddenLine xmlns:a14="http://schemas.microsoft.com/office/drawing/2010/main" xmlns="" w="9525">
                   <a:solidFill>
                     <a:srgbClr val="000000"/>
                   </a:solidFill>
@@ -2368,7 +2368,7 @@
             </a:ln>
             <a:extLst>
               <a:ext uri="{91240B29-F687-4f45-9708-019B960494DF}">
-                <a14:hiddenLine xmlns="" xmlns:a14="http://schemas.microsoft.com/office/drawing/2010/main" w="9525">
+                <a14:hiddenLine xmlns:a14="http://schemas.microsoft.com/office/drawing/2010/main" xmlns="" w="9525">
                   <a:solidFill>
                     <a:srgbClr val="000000"/>
                   </a:solidFill>
@@ -2458,7 +2458,7 @@
             </a:ln>
             <a:extLst>
               <a:ext uri="{91240B29-F687-4f45-9708-019B960494DF}">
-                <a14:hiddenLine xmlns="" xmlns:a14="http://schemas.microsoft.com/office/drawing/2010/main" w="9525">
+                <a14:hiddenLine xmlns:a14="http://schemas.microsoft.com/office/drawing/2010/main" xmlns="" w="9525">
                   <a:solidFill>
                     <a:srgbClr val="000000"/>
                   </a:solidFill>
@@ -2526,7 +2526,7 @@
             </a:ln>
             <a:extLst>
               <a:ext uri="{91240B29-F687-4f45-9708-019B960494DF}">
-                <a14:hiddenLine xmlns="" xmlns:a14="http://schemas.microsoft.com/office/drawing/2010/main" w="9525">
+                <a14:hiddenLine xmlns:a14="http://schemas.microsoft.com/office/drawing/2010/main" xmlns="" w="9525">
                   <a:solidFill>
                     <a:srgbClr val="000000"/>
                   </a:solidFill>
@@ -2616,7 +2616,7 @@
             </a:ln>
             <a:extLst>
               <a:ext uri="{91240B29-F687-4f45-9708-019B960494DF}">
-                <a14:hiddenLine xmlns="" xmlns:a14="http://schemas.microsoft.com/office/drawing/2010/main" w="9525">
+                <a14:hiddenLine xmlns:a14="http://schemas.microsoft.com/office/drawing/2010/main" xmlns="" w="9525">
                   <a:solidFill>
                     <a:srgbClr val="000000"/>
                   </a:solidFill>
@@ -2684,7 +2684,7 @@
             </a:ln>
             <a:extLst>
               <a:ext uri="{91240B29-F687-4f45-9708-019B960494DF}">
-                <a14:hiddenLine xmlns="" xmlns:a14="http://schemas.microsoft.com/office/drawing/2010/main" w="9525">
+                <a14:hiddenLine xmlns:a14="http://schemas.microsoft.com/office/drawing/2010/main" xmlns="" w="9525">
                   <a:solidFill>
                     <a:srgbClr val="000000"/>
                   </a:solidFill>
@@ -2774,7 +2774,7 @@
             </a:ln>
             <a:extLst>
               <a:ext uri="{91240B29-F687-4f45-9708-019B960494DF}">
-                <a14:hiddenLine xmlns="" xmlns:a14="http://schemas.microsoft.com/office/drawing/2010/main" w="9525">
+                <a14:hiddenLine xmlns:a14="http://schemas.microsoft.com/office/drawing/2010/main" xmlns="" w="9525">
                   <a:solidFill>
                     <a:srgbClr val="000000"/>
                   </a:solidFill>
@@ -2808,7 +2808,7 @@
             </a:ln>
             <a:extLst>
               <a:ext uri="{91240B29-F687-4f45-9708-019B960494DF}">
-                <a14:hiddenLine xmlns="" xmlns:a14="http://schemas.microsoft.com/office/drawing/2010/main" w="9525">
+                <a14:hiddenLine xmlns:a14="http://schemas.microsoft.com/office/drawing/2010/main" xmlns="" w="9525">
                   <a:solidFill>
                     <a:srgbClr val="000000"/>
                   </a:solidFill>
@@ -2898,7 +2898,7 @@
             </a:ln>
             <a:extLst>
               <a:ext uri="{91240B29-F687-4f45-9708-019B960494DF}">
-                <a14:hiddenLine xmlns="" xmlns:a14="http://schemas.microsoft.com/office/drawing/2010/main" w="9525">
+                <a14:hiddenLine xmlns:a14="http://schemas.microsoft.com/office/drawing/2010/main" xmlns="" w="9525">
                   <a:solidFill>
                     <a:srgbClr val="000000"/>
                   </a:solidFill>
@@ -2960,7 +2960,7 @@
             </a:ln>
             <a:extLst>
               <a:ext uri="{91240B29-F687-4f45-9708-019B960494DF}">
-                <a14:hiddenLine xmlns="" xmlns:a14="http://schemas.microsoft.com/office/drawing/2010/main" w="9525">
+                <a14:hiddenLine xmlns:a14="http://schemas.microsoft.com/office/drawing/2010/main" xmlns="" w="9525">
                   <a:solidFill>
                     <a:srgbClr val="000000"/>
                   </a:solidFill>
@@ -3022,7 +3022,7 @@
             </a:ln>
             <a:extLst>
               <a:ext uri="{91240B29-F687-4f45-9708-019B960494DF}">
-                <a14:hiddenLine xmlns="" xmlns:a14="http://schemas.microsoft.com/office/drawing/2010/main" w="9525">
+                <a14:hiddenLine xmlns:a14="http://schemas.microsoft.com/office/drawing/2010/main" xmlns="" w="9525">
                   <a:solidFill>
                     <a:srgbClr val="000000"/>
                   </a:solidFill>
@@ -3112,7 +3112,7 @@
             </a:ln>
             <a:extLst>
               <a:ext uri="{91240B29-F687-4f45-9708-019B960494DF}">
-                <a14:hiddenLine xmlns="" xmlns:a14="http://schemas.microsoft.com/office/drawing/2010/main" w="9525">
+                <a14:hiddenLine xmlns:a14="http://schemas.microsoft.com/office/drawing/2010/main" xmlns="" w="9525">
                   <a:solidFill>
                     <a:srgbClr val="000000"/>
                   </a:solidFill>
@@ -3180,7 +3180,7 @@
             </a:ln>
             <a:extLst>
               <a:ext uri="{91240B29-F687-4f45-9708-019B960494DF}">
-                <a14:hiddenLine xmlns="" xmlns:a14="http://schemas.microsoft.com/office/drawing/2010/main" w="9525">
+                <a14:hiddenLine xmlns:a14="http://schemas.microsoft.com/office/drawing/2010/main" xmlns="" w="9525">
                   <a:solidFill>
                     <a:srgbClr val="000000"/>
                   </a:solidFill>
@@ -3242,7 +3242,7 @@
             </a:ln>
             <a:extLst>
               <a:ext uri="{91240B29-F687-4f45-9708-019B960494DF}">
-                <a14:hiddenLine xmlns="" xmlns:a14="http://schemas.microsoft.com/office/drawing/2010/main" w="9525">
+                <a14:hiddenLine xmlns:a14="http://schemas.microsoft.com/office/drawing/2010/main" xmlns="" w="9525">
                   <a:solidFill>
                     <a:srgbClr val="000000"/>
                   </a:solidFill>
@@ -3332,7 +3332,7 @@
             </a:ln>
             <a:extLst>
               <a:ext uri="{91240B29-F687-4f45-9708-019B960494DF}">
-                <a14:hiddenLine xmlns="" xmlns:a14="http://schemas.microsoft.com/office/drawing/2010/main" w="9525">
+                <a14:hiddenLine xmlns:a14="http://schemas.microsoft.com/office/drawing/2010/main" xmlns="" w="9525">
                   <a:solidFill>
                     <a:srgbClr val="000000"/>
                   </a:solidFill>
@@ -3394,7 +3394,7 @@
             </a:ln>
             <a:extLst>
               <a:ext uri="{91240B29-F687-4f45-9708-019B960494DF}">
-                <a14:hiddenLine xmlns="" xmlns:a14="http://schemas.microsoft.com/office/drawing/2010/main" w="9525">
+                <a14:hiddenLine xmlns:a14="http://schemas.microsoft.com/office/drawing/2010/main" xmlns="" w="9525">
                   <a:solidFill>
                     <a:srgbClr val="000000"/>
                   </a:solidFill>
@@ -3484,7 +3484,7 @@
             </a:ln>
             <a:extLst>
               <a:ext uri="{91240B29-F687-4f45-9708-019B960494DF}">
-                <a14:hiddenLine xmlns="" xmlns:a14="http://schemas.microsoft.com/office/drawing/2010/main" w="9525">
+                <a14:hiddenLine xmlns:a14="http://schemas.microsoft.com/office/drawing/2010/main" xmlns="" w="9525">
                   <a:solidFill>
                     <a:srgbClr val="000000"/>
                   </a:solidFill>
@@ -3546,7 +3546,7 @@
             </a:ln>
             <a:extLst>
               <a:ext uri="{91240B29-F687-4f45-9708-019B960494DF}">
-                <a14:hiddenLine xmlns="" xmlns:a14="http://schemas.microsoft.com/office/drawing/2010/main" w="9525">
+                <a14:hiddenLine xmlns:a14="http://schemas.microsoft.com/office/drawing/2010/main" xmlns="" w="9525">
                   <a:solidFill>
                     <a:srgbClr val="000000"/>
                   </a:solidFill>
@@ -3636,7 +3636,7 @@
             </a:ln>
             <a:extLst>
               <a:ext uri="{91240B29-F687-4f45-9708-019B960494DF}">
-                <a14:hiddenLine xmlns="" xmlns:a14="http://schemas.microsoft.com/office/drawing/2010/main" w="9525">
+                <a14:hiddenLine xmlns:a14="http://schemas.microsoft.com/office/drawing/2010/main" xmlns="" w="9525">
                   <a:solidFill>
                     <a:srgbClr val="000000"/>
                   </a:solidFill>
@@ -3670,7 +3670,7 @@
             </a:ln>
             <a:extLst>
               <a:ext uri="{91240B29-F687-4f45-9708-019B960494DF}">
-                <a14:hiddenLine xmlns="" xmlns:a14="http://schemas.microsoft.com/office/drawing/2010/main" w="9525">
+                <a14:hiddenLine xmlns:a14="http://schemas.microsoft.com/office/drawing/2010/main" xmlns="" w="9525">
                   <a:solidFill>
                     <a:srgbClr val="000000"/>
                   </a:solidFill>
@@ -3735,7 +3735,7 @@
             </a:ln>
             <a:extLst>
               <a:ext uri="{91240B29-F687-4f45-9708-019B960494DF}">
-                <a14:hiddenLine xmlns="" xmlns:a14="http://schemas.microsoft.com/office/drawing/2010/main" w="9525">
+                <a14:hiddenLine xmlns:a14="http://schemas.microsoft.com/office/drawing/2010/main" xmlns="" w="9525">
                   <a:solidFill>
                     <a:srgbClr val="000000"/>
                   </a:solidFill>
@@ -3825,7 +3825,7 @@
             </a:ln>
             <a:extLst>
               <a:ext uri="{91240B29-F687-4f45-9708-019B960494DF}">
-                <a14:hiddenLine xmlns="" xmlns:a14="http://schemas.microsoft.com/office/drawing/2010/main" w="9525">
+                <a14:hiddenLine xmlns:a14="http://schemas.microsoft.com/office/drawing/2010/main" xmlns="" w="9525">
                   <a:solidFill>
                     <a:srgbClr val="000000"/>
                   </a:solidFill>
@@ -3887,7 +3887,7 @@
             </a:ln>
             <a:extLst>
               <a:ext uri="{91240B29-F687-4f45-9708-019B960494DF}">
-                <a14:hiddenLine xmlns="" xmlns:a14="http://schemas.microsoft.com/office/drawing/2010/main" w="9525">
+                <a14:hiddenLine xmlns:a14="http://schemas.microsoft.com/office/drawing/2010/main" xmlns="" w="9525">
                   <a:solidFill>
                     <a:srgbClr val="000000"/>
                   </a:solidFill>
@@ -3977,7 +3977,7 @@
             </a:ln>
             <a:extLst>
               <a:ext uri="{91240B29-F687-4f45-9708-019B960494DF}">
-                <a14:hiddenLine xmlns="" xmlns:a14="http://schemas.microsoft.com/office/drawing/2010/main" w="9525">
+                <a14:hiddenLine xmlns:a14="http://schemas.microsoft.com/office/drawing/2010/main" xmlns="" w="9525">
                   <a:solidFill>
                     <a:srgbClr val="000000"/>
                   </a:solidFill>
@@ -4067,7 +4067,7 @@
             </a:ln>
             <a:extLst>
               <a:ext uri="{91240B29-F687-4f45-9708-019B960494DF}">
-                <a14:hiddenLine xmlns="" xmlns:a14="http://schemas.microsoft.com/office/drawing/2010/main" w="9525">
+                <a14:hiddenLine xmlns:a14="http://schemas.microsoft.com/office/drawing/2010/main" xmlns="" w="9525">
                   <a:solidFill>
                     <a:srgbClr val="000000"/>
                   </a:solidFill>
@@ -4132,7 +4132,7 @@
             </a:ln>
             <a:extLst>
               <a:ext uri="{91240B29-F687-4f45-9708-019B960494DF}">
-                <a14:hiddenLine xmlns="" xmlns:a14="http://schemas.microsoft.com/office/drawing/2010/main" w="9525">
+                <a14:hiddenLine xmlns:a14="http://schemas.microsoft.com/office/drawing/2010/main" xmlns="" w="9525">
                   <a:solidFill>
                     <a:srgbClr val="000000"/>
                   </a:solidFill>
@@ -4194,7 +4194,7 @@
             </a:ln>
             <a:extLst>
               <a:ext uri="{91240B29-F687-4f45-9708-019B960494DF}">
-                <a14:hiddenLine xmlns="" xmlns:a14="http://schemas.microsoft.com/office/drawing/2010/main" w="9525">
+                <a14:hiddenLine xmlns:a14="http://schemas.microsoft.com/office/drawing/2010/main" xmlns="" w="9525">
                   <a:solidFill>
                     <a:srgbClr val="000000"/>
                   </a:solidFill>
@@ -4284,7 +4284,7 @@
             </a:ln>
             <a:extLst>
               <a:ext uri="{91240B29-F687-4f45-9708-019B960494DF}">
-                <a14:hiddenLine xmlns="" xmlns:a14="http://schemas.microsoft.com/office/drawing/2010/main" w="9525">
+                <a14:hiddenLine xmlns:a14="http://schemas.microsoft.com/office/drawing/2010/main" xmlns="" w="9525">
                   <a:solidFill>
                     <a:srgbClr val="000000"/>
                   </a:solidFill>
@@ -4374,7 +4374,7 @@
             </a:ln>
             <a:extLst>
               <a:ext uri="{91240B29-F687-4f45-9708-019B960494DF}">
-                <a14:hiddenLine xmlns="" xmlns:a14="http://schemas.microsoft.com/office/drawing/2010/main" w="9525">
+                <a14:hiddenLine xmlns:a14="http://schemas.microsoft.com/office/drawing/2010/main" xmlns="" w="9525">
                   <a:solidFill>
                     <a:srgbClr val="000000"/>
                   </a:solidFill>
@@ -4436,7 +4436,7 @@
             </a:ln>
             <a:extLst>
               <a:ext uri="{91240B29-F687-4f45-9708-019B960494DF}">
-                <a14:hiddenLine xmlns="" xmlns:a14="http://schemas.microsoft.com/office/drawing/2010/main" w="9525">
+                <a14:hiddenLine xmlns:a14="http://schemas.microsoft.com/office/drawing/2010/main" xmlns="" w="9525">
                   <a:solidFill>
                     <a:srgbClr val="000000"/>
                   </a:solidFill>
@@ -4556,7 +4556,7 @@
             </a:ln>
             <a:extLst>
               <a:ext uri="{91240B29-F687-4f45-9708-019B960494DF}">
-                <a14:hiddenLine xmlns="" xmlns:a14="http://schemas.microsoft.com/office/drawing/2010/main" w="9525">
+                <a14:hiddenLine xmlns:a14="http://schemas.microsoft.com/office/drawing/2010/main" xmlns="" w="9525">
                   <a:solidFill>
                     <a:srgbClr val="000000"/>
                   </a:solidFill>
@@ -4624,7 +4624,7 @@
             </a:ln>
             <a:extLst>
               <a:ext uri="{91240B29-F687-4f45-9708-019B960494DF}">
-                <a14:hiddenLine xmlns="" xmlns:a14="http://schemas.microsoft.com/office/drawing/2010/main" w="9525">
+                <a14:hiddenLine xmlns:a14="http://schemas.microsoft.com/office/drawing/2010/main" xmlns="" w="9525">
                   <a:solidFill>
                     <a:srgbClr val="000000"/>
                   </a:solidFill>
@@ -4714,7 +4714,7 @@
             </a:ln>
             <a:extLst>
               <a:ext uri="{91240B29-F687-4f45-9708-019B960494DF}">
-                <a14:hiddenLine xmlns="" xmlns:a14="http://schemas.microsoft.com/office/drawing/2010/main" w="9525">
+                <a14:hiddenLine xmlns:a14="http://schemas.microsoft.com/office/drawing/2010/main" xmlns="" w="9525">
                   <a:solidFill>
                     <a:srgbClr val="000000"/>
                   </a:solidFill>
@@ -4854,7 +4854,7 @@
           <a:p>
             <a:fld id="{EC4347D3-4C9A-C240-8F14-750059DFEEB0}" type="datetimeFigureOut">
               <a:rPr lang="en-US" smtClean="0"/>
-              <a:t>1/13/25</a:t>
+              <a:t>1/9/26</a:t>
             </a:fld>
             <a:endParaRPr lang="en-US"/>
           </a:p>
@@ -5121,7 +5121,7 @@
           <a:p>
             <a:fld id="{EC4347D3-4C9A-C240-8F14-750059DFEEB0}" type="datetimeFigureOut">
               <a:rPr lang="en-US" smtClean="0"/>
-              <a:t>1/13/25</a:t>
+              <a:t>1/9/26</a:t>
             </a:fld>
             <a:endParaRPr lang="en-US"/>
           </a:p>
@@ -5317,7 +5317,7 @@
           <a:p>
             <a:fld id="{EC4347D3-4C9A-C240-8F14-750059DFEEB0}" type="datetimeFigureOut">
               <a:rPr lang="en-US" smtClean="0"/>
-              <a:t>1/13/25</a:t>
+              <a:t>1/9/26</a:t>
             </a:fld>
             <a:endParaRPr lang="en-US"/>
           </a:p>
@@ -5580,7 +5580,7 @@
           <a:p>
             <a:fld id="{EC4347D3-4C9A-C240-8F14-750059DFEEB0}" type="datetimeFigureOut">
               <a:rPr lang="en-US" smtClean="0"/>
-              <a:t>1/13/25</a:t>
+              <a:t>1/9/26</a:t>
             </a:fld>
             <a:endParaRPr lang="en-US"/>
           </a:p>
@@ -6014,7 +6014,7 @@
           <a:p>
             <a:fld id="{EC4347D3-4C9A-C240-8F14-750059DFEEB0}" type="datetimeFigureOut">
               <a:rPr lang="en-US" smtClean="0"/>
-              <a:t>1/13/25</a:t>
+              <a:t>1/9/26</a:t>
             </a:fld>
             <a:endParaRPr lang="en-US"/>
           </a:p>
@@ -6560,7 +6560,7 @@
           <a:p>
             <a:fld id="{EC4347D3-4C9A-C240-8F14-750059DFEEB0}" type="datetimeFigureOut">
               <a:rPr lang="en-US" smtClean="0"/>
-              <a:t>1/13/25</a:t>
+              <a:t>1/9/26</a:t>
             </a:fld>
             <a:endParaRPr lang="en-US"/>
           </a:p>
@@ -7280,7 +7280,7 @@
           <a:p>
             <a:fld id="{EC4347D3-4C9A-C240-8F14-750059DFEEB0}" type="datetimeFigureOut">
               <a:rPr lang="en-US" smtClean="0"/>
-              <a:t>1/13/25</a:t>
+              <a:t>1/9/26</a:t>
             </a:fld>
             <a:endParaRPr lang="en-US"/>
           </a:p>
@@ -7450,7 +7450,7 @@
           <a:p>
             <a:fld id="{EC4347D3-4C9A-C240-8F14-750059DFEEB0}" type="datetimeFigureOut">
               <a:rPr lang="en-US" smtClean="0"/>
-              <a:t>1/13/25</a:t>
+              <a:t>1/9/26</a:t>
             </a:fld>
             <a:endParaRPr lang="en-US"/>
           </a:p>
@@ -7630,7 +7630,7 @@
           <a:p>
             <a:fld id="{EC4347D3-4C9A-C240-8F14-750059DFEEB0}" type="datetimeFigureOut">
               <a:rPr lang="en-US" smtClean="0"/>
-              <a:t>1/13/25</a:t>
+              <a:t>1/9/26</a:t>
             </a:fld>
             <a:endParaRPr lang="en-US"/>
           </a:p>
@@ -7800,7 +7800,7 @@
           <a:p>
             <a:fld id="{EC4347D3-4C9A-C240-8F14-750059DFEEB0}" type="datetimeFigureOut">
               <a:rPr lang="en-US" smtClean="0"/>
-              <a:t>1/13/25</a:t>
+              <a:t>1/9/26</a:t>
             </a:fld>
             <a:endParaRPr lang="en-US"/>
           </a:p>
@@ -8050,7 +8050,7 @@
           <a:p>
             <a:fld id="{EC4347D3-4C9A-C240-8F14-750059DFEEB0}" type="datetimeFigureOut">
               <a:rPr lang="en-US" smtClean="0"/>
-              <a:t>1/13/25</a:t>
+              <a:t>1/9/26</a:t>
             </a:fld>
             <a:endParaRPr lang="en-US"/>
           </a:p>
@@ -8282,7 +8282,7 @@
           <a:p>
             <a:fld id="{EC4347D3-4C9A-C240-8F14-750059DFEEB0}" type="datetimeFigureOut">
               <a:rPr lang="en-US" smtClean="0"/>
-              <a:t>1/13/25</a:t>
+              <a:t>1/9/26</a:t>
             </a:fld>
             <a:endParaRPr lang="en-US"/>
           </a:p>
@@ -8668,7 +8668,7 @@
           <a:p>
             <a:fld id="{EC4347D3-4C9A-C240-8F14-750059DFEEB0}" type="datetimeFigureOut">
               <a:rPr lang="en-US" smtClean="0"/>
-              <a:t>1/13/25</a:t>
+              <a:t>1/9/26</a:t>
             </a:fld>
             <a:endParaRPr lang="en-US"/>
           </a:p>
@@ -8791,7 +8791,7 @@
           <a:p>
             <a:fld id="{EC4347D3-4C9A-C240-8F14-750059DFEEB0}" type="datetimeFigureOut">
               <a:rPr lang="en-US" smtClean="0"/>
-              <a:t>1/13/25</a:t>
+              <a:t>1/9/26</a:t>
             </a:fld>
             <a:endParaRPr lang="en-US"/>
           </a:p>
@@ -8886,7 +8886,7 @@
           <a:p>
             <a:fld id="{EC4347D3-4C9A-C240-8F14-750059DFEEB0}" type="datetimeFigureOut">
               <a:rPr lang="en-US" smtClean="0"/>
-              <a:t>1/13/25</a:t>
+              <a:t>1/9/26</a:t>
             </a:fld>
             <a:endParaRPr lang="en-US"/>
           </a:p>
@@ -9135,7 +9135,7 @@
           <a:p>
             <a:fld id="{EC4347D3-4C9A-C240-8F14-750059DFEEB0}" type="datetimeFigureOut">
               <a:rPr lang="en-US" smtClean="0"/>
-              <a:t>1/13/25</a:t>
+              <a:t>1/9/26</a:t>
             </a:fld>
             <a:endParaRPr lang="en-US"/>
           </a:p>
@@ -9420,7 +9420,7 @@
           <a:p>
             <a:fld id="{EC4347D3-4C9A-C240-8F14-750059DFEEB0}" type="datetimeFigureOut">
               <a:rPr lang="en-US" smtClean="0"/>
-              <a:t>1/13/25</a:t>
+              <a:t>1/9/26</a:t>
             </a:fld>
             <a:endParaRPr lang="en-US"/>
           </a:p>
@@ -9543,7 +9543,7 @@
           <a:noFill/>
           <a:extLst>
             <a:ext uri="{909E8E84-426E-40dd-AFC4-6F175D3DCCD1}">
-              <a14:hiddenFill xmlns="" xmlns:a14="http://schemas.microsoft.com/office/drawing/2010/main">
+              <a14:hiddenFill xmlns:a14="http://schemas.microsoft.com/office/drawing/2010/main" xmlns="">
                 <a:solidFill>
                   <a:srgbClr val="FFFFFF"/>
                 </a:solidFill>
@@ -9617,7 +9617,7 @@
               </a:ln>
               <a:extLst>
                 <a:ext uri="{91240B29-F687-4f45-9708-019B960494DF}">
-                  <a14:hiddenLine xmlns="" xmlns:a14="http://schemas.microsoft.com/office/drawing/2010/main" w="9525">
+                  <a14:hiddenLine xmlns:a14="http://schemas.microsoft.com/office/drawing/2010/main" xmlns="" w="9525">
                     <a:solidFill>
                       <a:srgbClr val="000000"/>
                     </a:solidFill>
@@ -9707,7 +9707,7 @@
               </a:ln>
               <a:extLst>
                 <a:ext uri="{91240B29-F687-4f45-9708-019B960494DF}">
-                  <a14:hiddenLine xmlns="" xmlns:a14="http://schemas.microsoft.com/office/drawing/2010/main" w="9525">
+                  <a14:hiddenLine xmlns:a14="http://schemas.microsoft.com/office/drawing/2010/main" xmlns="" w="9525">
                     <a:solidFill>
                       <a:srgbClr val="000000"/>
                     </a:solidFill>
@@ -9797,7 +9797,7 @@
               </a:ln>
               <a:extLst>
                 <a:ext uri="{91240B29-F687-4f45-9708-019B960494DF}">
-                  <a14:hiddenLine xmlns="" xmlns:a14="http://schemas.microsoft.com/office/drawing/2010/main" w="9525">
+                  <a14:hiddenLine xmlns:a14="http://schemas.microsoft.com/office/drawing/2010/main" xmlns="" w="9525">
                     <a:solidFill>
                       <a:srgbClr val="000000"/>
                     </a:solidFill>
@@ -9859,7 +9859,7 @@
               </a:ln>
               <a:extLst>
                 <a:ext uri="{91240B29-F687-4f45-9708-019B960494DF}">
-                  <a14:hiddenLine xmlns="" xmlns:a14="http://schemas.microsoft.com/office/drawing/2010/main" w="9525">
+                  <a14:hiddenLine xmlns:a14="http://schemas.microsoft.com/office/drawing/2010/main" xmlns="" w="9525">
                     <a:solidFill>
                       <a:srgbClr val="000000"/>
                     </a:solidFill>
@@ -9949,7 +9949,7 @@
               </a:ln>
               <a:extLst>
                 <a:ext uri="{91240B29-F687-4f45-9708-019B960494DF}">
-                  <a14:hiddenLine xmlns="" xmlns:a14="http://schemas.microsoft.com/office/drawing/2010/main" w="9525">
+                  <a14:hiddenLine xmlns:a14="http://schemas.microsoft.com/office/drawing/2010/main" xmlns="" w="9525">
                     <a:solidFill>
                       <a:srgbClr val="000000"/>
                     </a:solidFill>
@@ -10011,7 +10011,7 @@
               </a:ln>
               <a:extLst>
                 <a:ext uri="{91240B29-F687-4f45-9708-019B960494DF}">
-                  <a14:hiddenLine xmlns="" xmlns:a14="http://schemas.microsoft.com/office/drawing/2010/main" w="9525">
+                  <a14:hiddenLine xmlns:a14="http://schemas.microsoft.com/office/drawing/2010/main" xmlns="" w="9525">
                     <a:solidFill>
                       <a:srgbClr val="000000"/>
                     </a:solidFill>
@@ -10073,7 +10073,7 @@
               </a:ln>
               <a:extLst>
                 <a:ext uri="{91240B29-F687-4f45-9708-019B960494DF}">
-                  <a14:hiddenLine xmlns="" xmlns:a14="http://schemas.microsoft.com/office/drawing/2010/main" w="9525">
+                  <a14:hiddenLine xmlns:a14="http://schemas.microsoft.com/office/drawing/2010/main" xmlns="" w="9525">
                     <a:solidFill>
                       <a:srgbClr val="000000"/>
                     </a:solidFill>
@@ -10163,7 +10163,7 @@
               </a:ln>
               <a:extLst>
                 <a:ext uri="{91240B29-F687-4f45-9708-019B960494DF}">
-                  <a14:hiddenLine xmlns="" xmlns:a14="http://schemas.microsoft.com/office/drawing/2010/main" w="9525">
+                  <a14:hiddenLine xmlns:a14="http://schemas.microsoft.com/office/drawing/2010/main" xmlns="" w="9525">
                     <a:solidFill>
                       <a:srgbClr val="000000"/>
                     </a:solidFill>
@@ -10253,7 +10253,7 @@
               </a:ln>
               <a:extLst>
                 <a:ext uri="{91240B29-F687-4f45-9708-019B960494DF}">
-                  <a14:hiddenLine xmlns="" xmlns:a14="http://schemas.microsoft.com/office/drawing/2010/main" w="9525">
+                  <a14:hiddenLine xmlns:a14="http://schemas.microsoft.com/office/drawing/2010/main" xmlns="" w="9525">
                     <a:solidFill>
                       <a:srgbClr val="000000"/>
                     </a:solidFill>
@@ -10315,7 +10315,7 @@
               </a:ln>
               <a:extLst>
                 <a:ext uri="{91240B29-F687-4f45-9708-019B960494DF}">
-                  <a14:hiddenLine xmlns="" xmlns:a14="http://schemas.microsoft.com/office/drawing/2010/main" w="9525">
+                  <a14:hiddenLine xmlns:a14="http://schemas.microsoft.com/office/drawing/2010/main" xmlns="" w="9525">
                     <a:solidFill>
                       <a:srgbClr val="000000"/>
                     </a:solidFill>
@@ -10425,7 +10425,7 @@
               </a:ln>
               <a:extLst>
                 <a:ext uri="{91240B29-F687-4f45-9708-019B960494DF}">
-                  <a14:hiddenLine xmlns="" xmlns:a14="http://schemas.microsoft.com/office/drawing/2010/main" w="9525">
+                  <a14:hiddenLine xmlns:a14="http://schemas.microsoft.com/office/drawing/2010/main" xmlns="" w="9525">
                     <a:solidFill>
                       <a:srgbClr val="000000"/>
                     </a:solidFill>
@@ -10509,7 +10509,7 @@
               </a:ln>
               <a:extLst>
                 <a:ext uri="{91240B29-F687-4f45-9708-019B960494DF}">
-                  <a14:hiddenLine xmlns="" xmlns:a14="http://schemas.microsoft.com/office/drawing/2010/main" w="9525">
+                  <a14:hiddenLine xmlns:a14="http://schemas.microsoft.com/office/drawing/2010/main" xmlns="" w="9525">
                     <a:solidFill>
                       <a:srgbClr val="000000"/>
                     </a:solidFill>
@@ -10571,7 +10571,7 @@
               </a:ln>
               <a:extLst>
                 <a:ext uri="{91240B29-F687-4f45-9708-019B960494DF}">
-                  <a14:hiddenLine xmlns="" xmlns:a14="http://schemas.microsoft.com/office/drawing/2010/main" w="9525">
+                  <a14:hiddenLine xmlns:a14="http://schemas.microsoft.com/office/drawing/2010/main" xmlns="" w="9525">
                     <a:solidFill>
                       <a:srgbClr val="000000"/>
                     </a:solidFill>
@@ -10633,7 +10633,7 @@
               </a:ln>
               <a:extLst>
                 <a:ext uri="{91240B29-F687-4f45-9708-019B960494DF}">
-                  <a14:hiddenLine xmlns="" xmlns:a14="http://schemas.microsoft.com/office/drawing/2010/main" w="9525">
+                  <a14:hiddenLine xmlns:a14="http://schemas.microsoft.com/office/drawing/2010/main" xmlns="" w="9525">
                     <a:solidFill>
                       <a:srgbClr val="000000"/>
                     </a:solidFill>
@@ -10723,7 +10723,7 @@
               </a:ln>
               <a:extLst>
                 <a:ext uri="{91240B29-F687-4f45-9708-019B960494DF}">
-                  <a14:hiddenLine xmlns="" xmlns:a14="http://schemas.microsoft.com/office/drawing/2010/main" w="9525">
+                  <a14:hiddenLine xmlns:a14="http://schemas.microsoft.com/office/drawing/2010/main" xmlns="" w="9525">
                     <a:solidFill>
                       <a:srgbClr val="000000"/>
                     </a:solidFill>
@@ -10757,7 +10757,7 @@
               </a:ln>
               <a:extLst>
                 <a:ext uri="{91240B29-F687-4f45-9708-019B960494DF}">
-                  <a14:hiddenLine xmlns="" xmlns:a14="http://schemas.microsoft.com/office/drawing/2010/main" w="9525">
+                  <a14:hiddenLine xmlns:a14="http://schemas.microsoft.com/office/drawing/2010/main" xmlns="" w="9525">
                     <a:solidFill>
                       <a:srgbClr val="000000"/>
                     </a:solidFill>
@@ -10822,7 +10822,7 @@
               </a:ln>
               <a:extLst>
                 <a:ext uri="{91240B29-F687-4f45-9708-019B960494DF}">
-                  <a14:hiddenLine xmlns="" xmlns:a14="http://schemas.microsoft.com/office/drawing/2010/main" w="9525">
+                  <a14:hiddenLine xmlns:a14="http://schemas.microsoft.com/office/drawing/2010/main" xmlns="" w="9525">
                     <a:solidFill>
                       <a:srgbClr val="000000"/>
                     </a:solidFill>
@@ -10912,7 +10912,7 @@
               </a:ln>
               <a:extLst>
                 <a:ext uri="{91240B29-F687-4f45-9708-019B960494DF}">
-                  <a14:hiddenLine xmlns="" xmlns:a14="http://schemas.microsoft.com/office/drawing/2010/main" w="9525">
+                  <a14:hiddenLine xmlns:a14="http://schemas.microsoft.com/office/drawing/2010/main" xmlns="" w="9525">
                     <a:solidFill>
                       <a:srgbClr val="000000"/>
                     </a:solidFill>
@@ -10974,7 +10974,7 @@
               </a:ln>
               <a:extLst>
                 <a:ext uri="{91240B29-F687-4f45-9708-019B960494DF}">
-                  <a14:hiddenLine xmlns="" xmlns:a14="http://schemas.microsoft.com/office/drawing/2010/main" w="9525">
+                  <a14:hiddenLine xmlns:a14="http://schemas.microsoft.com/office/drawing/2010/main" xmlns="" w="9525">
                     <a:solidFill>
                       <a:srgbClr val="000000"/>
                     </a:solidFill>
@@ -11064,7 +11064,7 @@
               </a:ln>
               <a:extLst>
                 <a:ext uri="{91240B29-F687-4f45-9708-019B960494DF}">
-                  <a14:hiddenLine xmlns="" xmlns:a14="http://schemas.microsoft.com/office/drawing/2010/main" w="9525">
+                  <a14:hiddenLine xmlns:a14="http://schemas.microsoft.com/office/drawing/2010/main" xmlns="" w="9525">
                     <a:solidFill>
                       <a:srgbClr val="000000"/>
                     </a:solidFill>
@@ -11129,7 +11129,7 @@
               </a:ln>
               <a:extLst>
                 <a:ext uri="{91240B29-F687-4f45-9708-019B960494DF}">
-                  <a14:hiddenLine xmlns="" xmlns:a14="http://schemas.microsoft.com/office/drawing/2010/main" w="9525">
+                  <a14:hiddenLine xmlns:a14="http://schemas.microsoft.com/office/drawing/2010/main" xmlns="" w="9525">
                     <a:solidFill>
                       <a:srgbClr val="000000"/>
                     </a:solidFill>
@@ -11191,7 +11191,7 @@
               </a:ln>
               <a:extLst>
                 <a:ext uri="{91240B29-F687-4f45-9708-019B960494DF}">
-                  <a14:hiddenLine xmlns="" xmlns:a14="http://schemas.microsoft.com/office/drawing/2010/main" w="9525">
+                  <a14:hiddenLine xmlns:a14="http://schemas.microsoft.com/office/drawing/2010/main" xmlns="" w="9525">
                     <a:solidFill>
                       <a:srgbClr val="000000"/>
                     </a:solidFill>
@@ -11281,7 +11281,7 @@
               </a:ln>
               <a:extLst>
                 <a:ext uri="{91240B29-F687-4f45-9708-019B960494DF}">
-                  <a14:hiddenLine xmlns="" xmlns:a14="http://schemas.microsoft.com/office/drawing/2010/main" w="9525">
+                  <a14:hiddenLine xmlns:a14="http://schemas.microsoft.com/office/drawing/2010/main" xmlns="" w="9525">
                     <a:solidFill>
                       <a:srgbClr val="000000"/>
                     </a:solidFill>
@@ -11371,7 +11371,7 @@
               </a:ln>
               <a:extLst>
                 <a:ext uri="{91240B29-F687-4f45-9708-019B960494DF}">
-                  <a14:hiddenLine xmlns="" xmlns:a14="http://schemas.microsoft.com/office/drawing/2010/main" w="9525">
+                  <a14:hiddenLine xmlns:a14="http://schemas.microsoft.com/office/drawing/2010/main" xmlns="" w="9525">
                     <a:solidFill>
                       <a:srgbClr val="000000"/>
                     </a:solidFill>
@@ -11436,7 +11436,7 @@
               </a:ln>
               <a:extLst>
                 <a:ext uri="{91240B29-F687-4f45-9708-019B960494DF}">
-                  <a14:hiddenLine xmlns="" xmlns:a14="http://schemas.microsoft.com/office/drawing/2010/main" w="9525">
+                  <a14:hiddenLine xmlns:a14="http://schemas.microsoft.com/office/drawing/2010/main" xmlns="" w="9525">
                     <a:solidFill>
                       <a:srgbClr val="000000"/>
                     </a:solidFill>
@@ -11556,7 +11556,7 @@
               </a:ln>
               <a:extLst>
                 <a:ext uri="{91240B29-F687-4f45-9708-019B960494DF}">
-                  <a14:hiddenLine xmlns="" xmlns:a14="http://schemas.microsoft.com/office/drawing/2010/main" w="9525">
+                  <a14:hiddenLine xmlns:a14="http://schemas.microsoft.com/office/drawing/2010/main" xmlns="" w="9525">
                     <a:solidFill>
                       <a:srgbClr val="000000"/>
                     </a:solidFill>
@@ -11637,7 +11637,7 @@
               </a:ln>
               <a:extLst>
                 <a:ext uri="{91240B29-F687-4f45-9708-019B960494DF}">
-                  <a14:hiddenLine xmlns="" xmlns:a14="http://schemas.microsoft.com/office/drawing/2010/main" w="9525">
+                  <a14:hiddenLine xmlns:a14="http://schemas.microsoft.com/office/drawing/2010/main" xmlns="" w="9525">
                     <a:solidFill>
                       <a:srgbClr val="000000"/>
                     </a:solidFill>
@@ -11752,7 +11752,7 @@
               </a:ln>
               <a:extLst>
                 <a:ext uri="{91240B29-F687-4f45-9708-019B960494DF}">
-                  <a14:hiddenLine xmlns="" xmlns:a14="http://schemas.microsoft.com/office/drawing/2010/main" w="9525">
+                  <a14:hiddenLine xmlns:a14="http://schemas.microsoft.com/office/drawing/2010/main" xmlns="" w="9525">
                     <a:solidFill>
                       <a:srgbClr val="000000"/>
                     </a:solidFill>
@@ -11842,7 +11842,7 @@
               </a:ln>
               <a:extLst>
                 <a:ext uri="{91240B29-F687-4f45-9708-019B960494DF}">
-                  <a14:hiddenLine xmlns="" xmlns:a14="http://schemas.microsoft.com/office/drawing/2010/main" w="9525">
+                  <a14:hiddenLine xmlns:a14="http://schemas.microsoft.com/office/drawing/2010/main" xmlns="" w="9525">
                     <a:solidFill>
                       <a:srgbClr val="000000"/>
                     </a:solidFill>
@@ -11907,7 +11907,7 @@
               </a:ln>
               <a:extLst>
                 <a:ext uri="{91240B29-F687-4f45-9708-019B960494DF}">
-                  <a14:hiddenLine xmlns="" xmlns:a14="http://schemas.microsoft.com/office/drawing/2010/main" w="9525">
+                  <a14:hiddenLine xmlns:a14="http://schemas.microsoft.com/office/drawing/2010/main" xmlns="" w="9525">
                     <a:solidFill>
                       <a:srgbClr val="000000"/>
                     </a:solidFill>
@@ -11997,7 +11997,7 @@
               </a:ln>
               <a:extLst>
                 <a:ext uri="{91240B29-F687-4f45-9708-019B960494DF}">
-                  <a14:hiddenLine xmlns="" xmlns:a14="http://schemas.microsoft.com/office/drawing/2010/main" w="9525">
+                  <a14:hiddenLine xmlns:a14="http://schemas.microsoft.com/office/drawing/2010/main" xmlns="" w="9525">
                     <a:solidFill>
                       <a:srgbClr val="000000"/>
                     </a:solidFill>
@@ -12065,7 +12065,7 @@
               </a:ln>
               <a:extLst>
                 <a:ext uri="{91240B29-F687-4f45-9708-019B960494DF}">
-                  <a14:hiddenLine xmlns="" xmlns:a14="http://schemas.microsoft.com/office/drawing/2010/main" w="9525">
+                  <a14:hiddenLine xmlns:a14="http://schemas.microsoft.com/office/drawing/2010/main" xmlns="" w="9525">
                     <a:solidFill>
                       <a:srgbClr val="000000"/>
                     </a:solidFill>
@@ -12155,7 +12155,7 @@
               </a:ln>
               <a:extLst>
                 <a:ext uri="{91240B29-F687-4f45-9708-019B960494DF}">
-                  <a14:hiddenLine xmlns="" xmlns:a14="http://schemas.microsoft.com/office/drawing/2010/main" w="9525">
+                  <a14:hiddenLine xmlns:a14="http://schemas.microsoft.com/office/drawing/2010/main" xmlns="" w="9525">
                     <a:solidFill>
                       <a:srgbClr val="000000"/>
                     </a:solidFill>
@@ -12223,7 +12223,7 @@
               </a:ln>
               <a:extLst>
                 <a:ext uri="{91240B29-F687-4f45-9708-019B960494DF}">
-                  <a14:hiddenLine xmlns="" xmlns:a14="http://schemas.microsoft.com/office/drawing/2010/main" w="9525">
+                  <a14:hiddenLine xmlns:a14="http://schemas.microsoft.com/office/drawing/2010/main" xmlns="" w="9525">
                     <a:solidFill>
                       <a:srgbClr val="000000"/>
                     </a:solidFill>
@@ -12313,7 +12313,7 @@
               </a:ln>
               <a:extLst>
                 <a:ext uri="{91240B29-F687-4f45-9708-019B960494DF}">
-                  <a14:hiddenLine xmlns="" xmlns:a14="http://schemas.microsoft.com/office/drawing/2010/main" w="9525">
+                  <a14:hiddenLine xmlns:a14="http://schemas.microsoft.com/office/drawing/2010/main" xmlns="" w="9525">
                     <a:solidFill>
                       <a:srgbClr val="000000"/>
                     </a:solidFill>
@@ -12347,7 +12347,7 @@
               </a:ln>
               <a:extLst>
                 <a:ext uri="{91240B29-F687-4f45-9708-019B960494DF}">
-                  <a14:hiddenLine xmlns="" xmlns:a14="http://schemas.microsoft.com/office/drawing/2010/main" w="9525">
+                  <a14:hiddenLine xmlns:a14="http://schemas.microsoft.com/office/drawing/2010/main" xmlns="" w="9525">
                     <a:solidFill>
                       <a:srgbClr val="000000"/>
                     </a:solidFill>
@@ -12487,7 +12487,7 @@
           <a:p>
             <a:fld id="{EC4347D3-4C9A-C240-8F14-750059DFEEB0}" type="datetimeFigureOut">
               <a:rPr lang="en-US" smtClean="0"/>
-              <a:t>1/13/25</a:t>
+              <a:t>1/9/26</a:t>
             </a:fld>
             <a:endParaRPr lang="en-US"/>
           </a:p>
@@ -13890,7 +13890,7 @@
                   <a:sysClr val="windowText" lastClr="000000"/>
                 </a:solidFill>
               </a:rPr>
-              <a:t> (except for the projector, and certain Fridays)</a:t>
+              <a:t> (except for the projector, and certain specific call activities)</a:t>
             </a:r>
           </a:p>
           <a:p>
@@ -13907,7 +13907,7 @@
                   <a:sysClr val="windowText" lastClr="000000"/>
                 </a:solidFill>
               </a:rPr>
-              <a:t>On homework Fridays, </a:t>
+              <a:t>On “lab days”, </a:t>
             </a:r>
             <a:r>
               <a:rPr lang="en-US" b="1" i="1" dirty="0">
@@ -14204,7 +14204,7 @@
                   <a:sysClr val="windowText" lastClr="000000"/>
                 </a:solidFill>
               </a:rPr>
-              <a:t>Limited lectures where I talk the whole time (only Mon. and Wed.)</a:t>
+              <a:t>Limited lectures where I talk the whole time (Tuesdays and partial Thursdays)</a:t>
             </a:r>
           </a:p>
           <a:p>
@@ -14238,7 +14238,7 @@
                   <a:sysClr val="windowText" lastClr="000000"/>
                 </a:solidFill>
               </a:rPr>
-              <a:t>Multiple Friday classes cancelled</a:t>
+              <a:t>A sprinkling of “time off”</a:t>
             </a:r>
           </a:p>
           <a:p>
@@ -15342,7 +15342,7 @@
           <a:p>
             <a:r>
               <a:rPr lang="en-US" b="1" i="1" u="sng" dirty="0"/>
-              <a:t>Friday Before Due Date</a:t>
+              <a:t>Thursday Before Due Date</a:t>
             </a:r>
             <a:r>
               <a:rPr lang="en-US" dirty="0"/>
@@ -16784,7 +16784,7 @@
             <a:pPr lvl="1"/>
             <a:r>
               <a:rPr lang="en-US" dirty="0"/>
-              <a:t>MWF 9:00 – 9:50 am @ Olsson Hall 018</a:t>
+              <a:t>Tu/Th 11:00 – 12:15 @ Thornton Hall E316</a:t>
             </a:r>
           </a:p>
           <a:p>
@@ -16918,7 +16918,7 @@
             </a:pPr>
             <a:r>
               <a:rPr lang="en-US" dirty="0"/>
-              <a:t>Lectures are held in-person, MWF (well, some Fridays)</a:t>
+              <a:t>Lectures are held in-person, Tu/Th</a:t>
             </a:r>
           </a:p>
           <a:p>
@@ -16934,7 +16934,7 @@
             </a:pPr>
             <a:r>
               <a:rPr lang="en-US" b="1" i="1" u="sng" dirty="0"/>
-              <a:t>Mon. / Wed.</a:t>
+              <a:t>Tuesday</a:t>
             </a:r>
             <a:r>
               <a:rPr lang="en-US" dirty="0"/>
@@ -16948,11 +16948,11 @@
             </a:pPr>
             <a:r>
               <a:rPr lang="en-US" b="1" i="1" u="sng" dirty="0"/>
-              <a:t>Friday</a:t>
+              <a:t>Thursday</a:t>
             </a:r>
             <a:r>
               <a:rPr lang="en-US" dirty="0"/>
-              <a:t>: Combination of homework labs (I’ll explain verbally), quizzes (2 of them), and cancellations</a:t>
+              <a:t>: Combination of homework labs (I’ll explain verbally), quizzes (2 of them), and partial lectures.</a:t>
             </a:r>
           </a:p>
           <a:p>
@@ -16962,7 +16962,15 @@
             </a:pPr>
             <a:r>
               <a:rPr lang="en-US" b="1" i="1" u="sng" dirty="0"/>
-              <a:t>Last four lectures</a:t>
+              <a:t>Last four (</a:t>
+            </a:r>
+            <a:r>
+              <a:rPr lang="en-US" b="1" i="1" u="sng" dirty="0" err="1"/>
+              <a:t>ish</a:t>
+            </a:r>
+            <a:r>
+              <a:rPr lang="en-US" b="1" i="1" u="sng" dirty="0"/>
+              <a:t>) lectures</a:t>
             </a:r>
             <a:r>
               <a:rPr lang="en-US" dirty="0"/>

</xml_diff>

<commit_message>
adding OH and things
</commit_message>
<xml_diff>
--- a/slides/00-CourseIntroduction.pptx
+++ b/slides/00-CourseIntroduction.pptx
@@ -221,7 +221,7 @@
           <a:p>
             <a:fld id="{C5B45307-6ED4-B142-BD64-10F739779302}" type="datetimeFigureOut">
               <a:rPr lang="en-US" smtClean="0"/>
-              <a:t>1/12/26</a:t>
+              <a:t>1/13/26</a:t>
             </a:fld>
             <a:endParaRPr lang="en-US"/>
           </a:p>
@@ -629,7 +629,7 @@
           <a:noFill/>
           <a:extLst>
             <a:ext uri="{909E8E84-426E-40dd-AFC4-6F175D3DCCD1}">
-              <a14:hiddenFill xmlns="" xmlns:a14="http://schemas.microsoft.com/office/drawing/2010/main">
+              <a14:hiddenFill xmlns:a14="http://schemas.microsoft.com/office/drawing/2010/main" xmlns="">
                 <a:solidFill>
                   <a:srgbClr val="FFFFFF"/>
                 </a:solidFill>
@@ -688,7 +688,7 @@
             </a:ln>
             <a:extLst>
               <a:ext uri="{91240B29-F687-4f45-9708-019B960494DF}">
-                <a14:hiddenLine xmlns="" xmlns:a14="http://schemas.microsoft.com/office/drawing/2010/main" w="9525">
+                <a14:hiddenLine xmlns:a14="http://schemas.microsoft.com/office/drawing/2010/main" xmlns="" w="9525">
                   <a:solidFill>
                     <a:srgbClr val="000000"/>
                   </a:solidFill>
@@ -778,7 +778,7 @@
             </a:ln>
             <a:extLst>
               <a:ext uri="{91240B29-F687-4f45-9708-019B960494DF}">
-                <a14:hiddenLine xmlns="" xmlns:a14="http://schemas.microsoft.com/office/drawing/2010/main" w="9525">
+                <a14:hiddenLine xmlns:a14="http://schemas.microsoft.com/office/drawing/2010/main" xmlns="" w="9525">
                   <a:solidFill>
                     <a:srgbClr val="000000"/>
                   </a:solidFill>
@@ -868,7 +868,7 @@
             </a:ln>
             <a:extLst>
               <a:ext uri="{91240B29-F687-4f45-9708-019B960494DF}">
-                <a14:hiddenLine xmlns="" xmlns:a14="http://schemas.microsoft.com/office/drawing/2010/main" w="9525">
+                <a14:hiddenLine xmlns:a14="http://schemas.microsoft.com/office/drawing/2010/main" xmlns="" w="9525">
                   <a:solidFill>
                     <a:srgbClr val="000000"/>
                   </a:solidFill>
@@ -902,7 +902,7 @@
             </a:ln>
             <a:extLst>
               <a:ext uri="{91240B29-F687-4f45-9708-019B960494DF}">
-                <a14:hiddenLine xmlns="" xmlns:a14="http://schemas.microsoft.com/office/drawing/2010/main" w="9525">
+                <a14:hiddenLine xmlns:a14="http://schemas.microsoft.com/office/drawing/2010/main" xmlns="" w="9525">
                   <a:solidFill>
                     <a:srgbClr val="000000"/>
                   </a:solidFill>
@@ -992,7 +992,7 @@
             </a:ln>
             <a:extLst>
               <a:ext uri="{91240B29-F687-4f45-9708-019B960494DF}">
-                <a14:hiddenLine xmlns="" xmlns:a14="http://schemas.microsoft.com/office/drawing/2010/main" w="9525">
+                <a14:hiddenLine xmlns:a14="http://schemas.microsoft.com/office/drawing/2010/main" xmlns="" w="9525">
                   <a:solidFill>
                     <a:srgbClr val="000000"/>
                   </a:solidFill>
@@ -1054,7 +1054,7 @@
             </a:ln>
             <a:extLst>
               <a:ext uri="{91240B29-F687-4f45-9708-019B960494DF}">
-                <a14:hiddenLine xmlns="" xmlns:a14="http://schemas.microsoft.com/office/drawing/2010/main" w="9525">
+                <a14:hiddenLine xmlns:a14="http://schemas.microsoft.com/office/drawing/2010/main" xmlns="" w="9525">
                   <a:solidFill>
                     <a:srgbClr val="000000"/>
                   </a:solidFill>
@@ -1116,7 +1116,7 @@
             </a:ln>
             <a:extLst>
               <a:ext uri="{91240B29-F687-4f45-9708-019B960494DF}">
-                <a14:hiddenLine xmlns="" xmlns:a14="http://schemas.microsoft.com/office/drawing/2010/main" w="9525">
+                <a14:hiddenLine xmlns:a14="http://schemas.microsoft.com/office/drawing/2010/main" xmlns="" w="9525">
                   <a:solidFill>
                     <a:srgbClr val="000000"/>
                   </a:solidFill>
@@ -1206,7 +1206,7 @@
             </a:ln>
             <a:extLst>
               <a:ext uri="{91240B29-F687-4f45-9708-019B960494DF}">
-                <a14:hiddenLine xmlns="" xmlns:a14="http://schemas.microsoft.com/office/drawing/2010/main" w="9525">
+                <a14:hiddenLine xmlns:a14="http://schemas.microsoft.com/office/drawing/2010/main" xmlns="" w="9525">
                   <a:solidFill>
                     <a:srgbClr val="000000"/>
                   </a:solidFill>
@@ -1268,7 +1268,7 @@
             </a:ln>
             <a:extLst>
               <a:ext uri="{91240B29-F687-4f45-9708-019B960494DF}">
-                <a14:hiddenLine xmlns="" xmlns:a14="http://schemas.microsoft.com/office/drawing/2010/main" w="9525">
+                <a14:hiddenLine xmlns:a14="http://schemas.microsoft.com/office/drawing/2010/main" xmlns="" w="9525">
                   <a:solidFill>
                     <a:srgbClr val="000000"/>
                   </a:solidFill>
@@ -1330,7 +1330,7 @@
             </a:ln>
             <a:extLst>
               <a:ext uri="{91240B29-F687-4f45-9708-019B960494DF}">
-                <a14:hiddenLine xmlns="" xmlns:a14="http://schemas.microsoft.com/office/drawing/2010/main" w="9525">
+                <a14:hiddenLine xmlns:a14="http://schemas.microsoft.com/office/drawing/2010/main" xmlns="" w="9525">
                   <a:solidFill>
                     <a:srgbClr val="000000"/>
                   </a:solidFill>
@@ -1420,7 +1420,7 @@
             </a:ln>
             <a:extLst>
               <a:ext uri="{91240B29-F687-4f45-9708-019B960494DF}">
-                <a14:hiddenLine xmlns="" xmlns:a14="http://schemas.microsoft.com/office/drawing/2010/main" w="9525">
+                <a14:hiddenLine xmlns:a14="http://schemas.microsoft.com/office/drawing/2010/main" xmlns="" w="9525">
                   <a:solidFill>
                     <a:srgbClr val="000000"/>
                   </a:solidFill>
@@ -1510,7 +1510,7 @@
             </a:ln>
             <a:extLst>
               <a:ext uri="{91240B29-F687-4f45-9708-019B960494DF}">
-                <a14:hiddenLine xmlns="" xmlns:a14="http://schemas.microsoft.com/office/drawing/2010/main" w="9525">
+                <a14:hiddenLine xmlns:a14="http://schemas.microsoft.com/office/drawing/2010/main" xmlns="" w="9525">
                   <a:solidFill>
                     <a:srgbClr val="000000"/>
                   </a:solidFill>
@@ -1572,7 +1572,7 @@
             </a:ln>
             <a:extLst>
               <a:ext uri="{91240B29-F687-4f45-9708-019B960494DF}">
-                <a14:hiddenLine xmlns="" xmlns:a14="http://schemas.microsoft.com/office/drawing/2010/main" w="9525">
+                <a14:hiddenLine xmlns:a14="http://schemas.microsoft.com/office/drawing/2010/main" xmlns="" w="9525">
                   <a:solidFill>
                     <a:srgbClr val="000000"/>
                   </a:solidFill>
@@ -1682,7 +1682,7 @@
             </a:ln>
             <a:extLst>
               <a:ext uri="{91240B29-F687-4f45-9708-019B960494DF}">
-                <a14:hiddenLine xmlns="" xmlns:a14="http://schemas.microsoft.com/office/drawing/2010/main" w="9525">
+                <a14:hiddenLine xmlns:a14="http://schemas.microsoft.com/office/drawing/2010/main" xmlns="" w="9525">
                   <a:solidFill>
                     <a:srgbClr val="000000"/>
                   </a:solidFill>
@@ -1744,7 +1744,7 @@
             </a:ln>
             <a:extLst>
               <a:ext uri="{91240B29-F687-4f45-9708-019B960494DF}">
-                <a14:hiddenLine xmlns="" xmlns:a14="http://schemas.microsoft.com/office/drawing/2010/main" w="9525">
+                <a14:hiddenLine xmlns:a14="http://schemas.microsoft.com/office/drawing/2010/main" xmlns="" w="9525">
                   <a:solidFill>
                     <a:srgbClr val="000000"/>
                   </a:solidFill>
@@ -1834,7 +1834,7 @@
             </a:ln>
             <a:extLst>
               <a:ext uri="{91240B29-F687-4f45-9708-019B960494DF}">
-                <a14:hiddenLine xmlns="" xmlns:a14="http://schemas.microsoft.com/office/drawing/2010/main" w="9525">
+                <a14:hiddenLine xmlns:a14="http://schemas.microsoft.com/office/drawing/2010/main" xmlns="" w="9525">
                   <a:solidFill>
                     <a:srgbClr val="000000"/>
                   </a:solidFill>
@@ -1924,7 +1924,7 @@
             </a:ln>
             <a:extLst>
               <a:ext uri="{91240B29-F687-4f45-9708-019B960494DF}">
-                <a14:hiddenLine xmlns="" xmlns:a14="http://schemas.microsoft.com/office/drawing/2010/main" w="9525">
+                <a14:hiddenLine xmlns:a14="http://schemas.microsoft.com/office/drawing/2010/main" xmlns="" w="9525">
                   <a:solidFill>
                     <a:srgbClr val="000000"/>
                   </a:solidFill>
@@ -1986,7 +1986,7 @@
             </a:ln>
             <a:extLst>
               <a:ext uri="{91240B29-F687-4f45-9708-019B960494DF}">
-                <a14:hiddenLine xmlns="" xmlns:a14="http://schemas.microsoft.com/office/drawing/2010/main" w="9525">
+                <a14:hiddenLine xmlns:a14="http://schemas.microsoft.com/office/drawing/2010/main" xmlns="" w="9525">
                   <a:solidFill>
                     <a:srgbClr val="000000"/>
                   </a:solidFill>
@@ -2076,7 +2076,7 @@
             </a:ln>
             <a:extLst>
               <a:ext uri="{91240B29-F687-4f45-9708-019B960494DF}">
-                <a14:hiddenLine xmlns="" xmlns:a14="http://schemas.microsoft.com/office/drawing/2010/main" w="9525">
+                <a14:hiddenLine xmlns:a14="http://schemas.microsoft.com/office/drawing/2010/main" xmlns="" w="9525">
                   <a:solidFill>
                     <a:srgbClr val="000000"/>
                   </a:solidFill>
@@ -2166,7 +2166,7 @@
             </a:ln>
             <a:extLst>
               <a:ext uri="{91240B29-F687-4f45-9708-019B960494DF}">
-                <a14:hiddenLine xmlns="" xmlns:a14="http://schemas.microsoft.com/office/drawing/2010/main" w="9525">
+                <a14:hiddenLine xmlns:a14="http://schemas.microsoft.com/office/drawing/2010/main" xmlns="" w="9525">
                   <a:solidFill>
                     <a:srgbClr val="000000"/>
                   </a:solidFill>
@@ -2222,7 +2222,7 @@
             </a:ln>
             <a:extLst>
               <a:ext uri="{91240B29-F687-4f45-9708-019B960494DF}">
-                <a14:hiddenLine xmlns="" xmlns:a14="http://schemas.microsoft.com/office/drawing/2010/main" w="9525">
+                <a14:hiddenLine xmlns:a14="http://schemas.microsoft.com/office/drawing/2010/main" xmlns="" w="9525">
                   <a:solidFill>
                     <a:srgbClr val="000000"/>
                   </a:solidFill>
@@ -2312,7 +2312,7 @@
             </a:ln>
             <a:extLst>
               <a:ext uri="{91240B29-F687-4f45-9708-019B960494DF}">
-                <a14:hiddenLine xmlns="" xmlns:a14="http://schemas.microsoft.com/office/drawing/2010/main" w="9525">
+                <a14:hiddenLine xmlns:a14="http://schemas.microsoft.com/office/drawing/2010/main" xmlns="" w="9525">
                   <a:solidFill>
                     <a:srgbClr val="000000"/>
                   </a:solidFill>
@@ -2368,7 +2368,7 @@
             </a:ln>
             <a:extLst>
               <a:ext uri="{91240B29-F687-4f45-9708-019B960494DF}">
-                <a14:hiddenLine xmlns="" xmlns:a14="http://schemas.microsoft.com/office/drawing/2010/main" w="9525">
+                <a14:hiddenLine xmlns:a14="http://schemas.microsoft.com/office/drawing/2010/main" xmlns="" w="9525">
                   <a:solidFill>
                     <a:srgbClr val="000000"/>
                   </a:solidFill>
@@ -2458,7 +2458,7 @@
             </a:ln>
             <a:extLst>
               <a:ext uri="{91240B29-F687-4f45-9708-019B960494DF}">
-                <a14:hiddenLine xmlns="" xmlns:a14="http://schemas.microsoft.com/office/drawing/2010/main" w="9525">
+                <a14:hiddenLine xmlns:a14="http://schemas.microsoft.com/office/drawing/2010/main" xmlns="" w="9525">
                   <a:solidFill>
                     <a:srgbClr val="000000"/>
                   </a:solidFill>
@@ -2526,7 +2526,7 @@
             </a:ln>
             <a:extLst>
               <a:ext uri="{91240B29-F687-4f45-9708-019B960494DF}">
-                <a14:hiddenLine xmlns="" xmlns:a14="http://schemas.microsoft.com/office/drawing/2010/main" w="9525">
+                <a14:hiddenLine xmlns:a14="http://schemas.microsoft.com/office/drawing/2010/main" xmlns="" w="9525">
                   <a:solidFill>
                     <a:srgbClr val="000000"/>
                   </a:solidFill>
@@ -2616,7 +2616,7 @@
             </a:ln>
             <a:extLst>
               <a:ext uri="{91240B29-F687-4f45-9708-019B960494DF}">
-                <a14:hiddenLine xmlns="" xmlns:a14="http://schemas.microsoft.com/office/drawing/2010/main" w="9525">
+                <a14:hiddenLine xmlns:a14="http://schemas.microsoft.com/office/drawing/2010/main" xmlns="" w="9525">
                   <a:solidFill>
                     <a:srgbClr val="000000"/>
                   </a:solidFill>
@@ -2684,7 +2684,7 @@
             </a:ln>
             <a:extLst>
               <a:ext uri="{91240B29-F687-4f45-9708-019B960494DF}">
-                <a14:hiddenLine xmlns="" xmlns:a14="http://schemas.microsoft.com/office/drawing/2010/main" w="9525">
+                <a14:hiddenLine xmlns:a14="http://schemas.microsoft.com/office/drawing/2010/main" xmlns="" w="9525">
                   <a:solidFill>
                     <a:srgbClr val="000000"/>
                   </a:solidFill>
@@ -2774,7 +2774,7 @@
             </a:ln>
             <a:extLst>
               <a:ext uri="{91240B29-F687-4f45-9708-019B960494DF}">
-                <a14:hiddenLine xmlns="" xmlns:a14="http://schemas.microsoft.com/office/drawing/2010/main" w="9525">
+                <a14:hiddenLine xmlns:a14="http://schemas.microsoft.com/office/drawing/2010/main" xmlns="" w="9525">
                   <a:solidFill>
                     <a:srgbClr val="000000"/>
                   </a:solidFill>
@@ -2808,7 +2808,7 @@
             </a:ln>
             <a:extLst>
               <a:ext uri="{91240B29-F687-4f45-9708-019B960494DF}">
-                <a14:hiddenLine xmlns="" xmlns:a14="http://schemas.microsoft.com/office/drawing/2010/main" w="9525">
+                <a14:hiddenLine xmlns:a14="http://schemas.microsoft.com/office/drawing/2010/main" xmlns="" w="9525">
                   <a:solidFill>
                     <a:srgbClr val="000000"/>
                   </a:solidFill>
@@ -2898,7 +2898,7 @@
             </a:ln>
             <a:extLst>
               <a:ext uri="{91240B29-F687-4f45-9708-019B960494DF}">
-                <a14:hiddenLine xmlns="" xmlns:a14="http://schemas.microsoft.com/office/drawing/2010/main" w="9525">
+                <a14:hiddenLine xmlns:a14="http://schemas.microsoft.com/office/drawing/2010/main" xmlns="" w="9525">
                   <a:solidFill>
                     <a:srgbClr val="000000"/>
                   </a:solidFill>
@@ -2960,7 +2960,7 @@
             </a:ln>
             <a:extLst>
               <a:ext uri="{91240B29-F687-4f45-9708-019B960494DF}">
-                <a14:hiddenLine xmlns="" xmlns:a14="http://schemas.microsoft.com/office/drawing/2010/main" w="9525">
+                <a14:hiddenLine xmlns:a14="http://schemas.microsoft.com/office/drawing/2010/main" xmlns="" w="9525">
                   <a:solidFill>
                     <a:srgbClr val="000000"/>
                   </a:solidFill>
@@ -3022,7 +3022,7 @@
             </a:ln>
             <a:extLst>
               <a:ext uri="{91240B29-F687-4f45-9708-019B960494DF}">
-                <a14:hiddenLine xmlns="" xmlns:a14="http://schemas.microsoft.com/office/drawing/2010/main" w="9525">
+                <a14:hiddenLine xmlns:a14="http://schemas.microsoft.com/office/drawing/2010/main" xmlns="" w="9525">
                   <a:solidFill>
                     <a:srgbClr val="000000"/>
                   </a:solidFill>
@@ -3112,7 +3112,7 @@
             </a:ln>
             <a:extLst>
               <a:ext uri="{91240B29-F687-4f45-9708-019B960494DF}">
-                <a14:hiddenLine xmlns="" xmlns:a14="http://schemas.microsoft.com/office/drawing/2010/main" w="9525">
+                <a14:hiddenLine xmlns:a14="http://schemas.microsoft.com/office/drawing/2010/main" xmlns="" w="9525">
                   <a:solidFill>
                     <a:srgbClr val="000000"/>
                   </a:solidFill>
@@ -3180,7 +3180,7 @@
             </a:ln>
             <a:extLst>
               <a:ext uri="{91240B29-F687-4f45-9708-019B960494DF}">
-                <a14:hiddenLine xmlns="" xmlns:a14="http://schemas.microsoft.com/office/drawing/2010/main" w="9525">
+                <a14:hiddenLine xmlns:a14="http://schemas.microsoft.com/office/drawing/2010/main" xmlns="" w="9525">
                   <a:solidFill>
                     <a:srgbClr val="000000"/>
                   </a:solidFill>
@@ -3242,7 +3242,7 @@
             </a:ln>
             <a:extLst>
               <a:ext uri="{91240B29-F687-4f45-9708-019B960494DF}">
-                <a14:hiddenLine xmlns="" xmlns:a14="http://schemas.microsoft.com/office/drawing/2010/main" w="9525">
+                <a14:hiddenLine xmlns:a14="http://schemas.microsoft.com/office/drawing/2010/main" xmlns="" w="9525">
                   <a:solidFill>
                     <a:srgbClr val="000000"/>
                   </a:solidFill>
@@ -3332,7 +3332,7 @@
             </a:ln>
             <a:extLst>
               <a:ext uri="{91240B29-F687-4f45-9708-019B960494DF}">
-                <a14:hiddenLine xmlns="" xmlns:a14="http://schemas.microsoft.com/office/drawing/2010/main" w="9525">
+                <a14:hiddenLine xmlns:a14="http://schemas.microsoft.com/office/drawing/2010/main" xmlns="" w="9525">
                   <a:solidFill>
                     <a:srgbClr val="000000"/>
                   </a:solidFill>
@@ -3394,7 +3394,7 @@
             </a:ln>
             <a:extLst>
               <a:ext uri="{91240B29-F687-4f45-9708-019B960494DF}">
-                <a14:hiddenLine xmlns="" xmlns:a14="http://schemas.microsoft.com/office/drawing/2010/main" w="9525">
+                <a14:hiddenLine xmlns:a14="http://schemas.microsoft.com/office/drawing/2010/main" xmlns="" w="9525">
                   <a:solidFill>
                     <a:srgbClr val="000000"/>
                   </a:solidFill>
@@ -3484,7 +3484,7 @@
             </a:ln>
             <a:extLst>
               <a:ext uri="{91240B29-F687-4f45-9708-019B960494DF}">
-                <a14:hiddenLine xmlns="" xmlns:a14="http://schemas.microsoft.com/office/drawing/2010/main" w="9525">
+                <a14:hiddenLine xmlns:a14="http://schemas.microsoft.com/office/drawing/2010/main" xmlns="" w="9525">
                   <a:solidFill>
                     <a:srgbClr val="000000"/>
                   </a:solidFill>
@@ -3546,7 +3546,7 @@
             </a:ln>
             <a:extLst>
               <a:ext uri="{91240B29-F687-4f45-9708-019B960494DF}">
-                <a14:hiddenLine xmlns="" xmlns:a14="http://schemas.microsoft.com/office/drawing/2010/main" w="9525">
+                <a14:hiddenLine xmlns:a14="http://schemas.microsoft.com/office/drawing/2010/main" xmlns="" w="9525">
                   <a:solidFill>
                     <a:srgbClr val="000000"/>
                   </a:solidFill>
@@ -3636,7 +3636,7 @@
             </a:ln>
             <a:extLst>
               <a:ext uri="{91240B29-F687-4f45-9708-019B960494DF}">
-                <a14:hiddenLine xmlns="" xmlns:a14="http://schemas.microsoft.com/office/drawing/2010/main" w="9525">
+                <a14:hiddenLine xmlns:a14="http://schemas.microsoft.com/office/drawing/2010/main" xmlns="" w="9525">
                   <a:solidFill>
                     <a:srgbClr val="000000"/>
                   </a:solidFill>
@@ -3670,7 +3670,7 @@
             </a:ln>
             <a:extLst>
               <a:ext uri="{91240B29-F687-4f45-9708-019B960494DF}">
-                <a14:hiddenLine xmlns="" xmlns:a14="http://schemas.microsoft.com/office/drawing/2010/main" w="9525">
+                <a14:hiddenLine xmlns:a14="http://schemas.microsoft.com/office/drawing/2010/main" xmlns="" w="9525">
                   <a:solidFill>
                     <a:srgbClr val="000000"/>
                   </a:solidFill>
@@ -3735,7 +3735,7 @@
             </a:ln>
             <a:extLst>
               <a:ext uri="{91240B29-F687-4f45-9708-019B960494DF}">
-                <a14:hiddenLine xmlns="" xmlns:a14="http://schemas.microsoft.com/office/drawing/2010/main" w="9525">
+                <a14:hiddenLine xmlns:a14="http://schemas.microsoft.com/office/drawing/2010/main" xmlns="" w="9525">
                   <a:solidFill>
                     <a:srgbClr val="000000"/>
                   </a:solidFill>
@@ -3825,7 +3825,7 @@
             </a:ln>
             <a:extLst>
               <a:ext uri="{91240B29-F687-4f45-9708-019B960494DF}">
-                <a14:hiddenLine xmlns="" xmlns:a14="http://schemas.microsoft.com/office/drawing/2010/main" w="9525">
+                <a14:hiddenLine xmlns:a14="http://schemas.microsoft.com/office/drawing/2010/main" xmlns="" w="9525">
                   <a:solidFill>
                     <a:srgbClr val="000000"/>
                   </a:solidFill>
@@ -3887,7 +3887,7 @@
             </a:ln>
             <a:extLst>
               <a:ext uri="{91240B29-F687-4f45-9708-019B960494DF}">
-                <a14:hiddenLine xmlns="" xmlns:a14="http://schemas.microsoft.com/office/drawing/2010/main" w="9525">
+                <a14:hiddenLine xmlns:a14="http://schemas.microsoft.com/office/drawing/2010/main" xmlns="" w="9525">
                   <a:solidFill>
                     <a:srgbClr val="000000"/>
                   </a:solidFill>
@@ -3977,7 +3977,7 @@
             </a:ln>
             <a:extLst>
               <a:ext uri="{91240B29-F687-4f45-9708-019B960494DF}">
-                <a14:hiddenLine xmlns="" xmlns:a14="http://schemas.microsoft.com/office/drawing/2010/main" w="9525">
+                <a14:hiddenLine xmlns:a14="http://schemas.microsoft.com/office/drawing/2010/main" xmlns="" w="9525">
                   <a:solidFill>
                     <a:srgbClr val="000000"/>
                   </a:solidFill>
@@ -4067,7 +4067,7 @@
             </a:ln>
             <a:extLst>
               <a:ext uri="{91240B29-F687-4f45-9708-019B960494DF}">
-                <a14:hiddenLine xmlns="" xmlns:a14="http://schemas.microsoft.com/office/drawing/2010/main" w="9525">
+                <a14:hiddenLine xmlns:a14="http://schemas.microsoft.com/office/drawing/2010/main" xmlns="" w="9525">
                   <a:solidFill>
                     <a:srgbClr val="000000"/>
                   </a:solidFill>
@@ -4132,7 +4132,7 @@
             </a:ln>
             <a:extLst>
               <a:ext uri="{91240B29-F687-4f45-9708-019B960494DF}">
-                <a14:hiddenLine xmlns="" xmlns:a14="http://schemas.microsoft.com/office/drawing/2010/main" w="9525">
+                <a14:hiddenLine xmlns:a14="http://schemas.microsoft.com/office/drawing/2010/main" xmlns="" w="9525">
                   <a:solidFill>
                     <a:srgbClr val="000000"/>
                   </a:solidFill>
@@ -4194,7 +4194,7 @@
             </a:ln>
             <a:extLst>
               <a:ext uri="{91240B29-F687-4f45-9708-019B960494DF}">
-                <a14:hiddenLine xmlns="" xmlns:a14="http://schemas.microsoft.com/office/drawing/2010/main" w="9525">
+                <a14:hiddenLine xmlns:a14="http://schemas.microsoft.com/office/drawing/2010/main" xmlns="" w="9525">
                   <a:solidFill>
                     <a:srgbClr val="000000"/>
                   </a:solidFill>
@@ -4284,7 +4284,7 @@
             </a:ln>
             <a:extLst>
               <a:ext uri="{91240B29-F687-4f45-9708-019B960494DF}">
-                <a14:hiddenLine xmlns="" xmlns:a14="http://schemas.microsoft.com/office/drawing/2010/main" w="9525">
+                <a14:hiddenLine xmlns:a14="http://schemas.microsoft.com/office/drawing/2010/main" xmlns="" w="9525">
                   <a:solidFill>
                     <a:srgbClr val="000000"/>
                   </a:solidFill>
@@ -4374,7 +4374,7 @@
             </a:ln>
             <a:extLst>
               <a:ext uri="{91240B29-F687-4f45-9708-019B960494DF}">
-                <a14:hiddenLine xmlns="" xmlns:a14="http://schemas.microsoft.com/office/drawing/2010/main" w="9525">
+                <a14:hiddenLine xmlns:a14="http://schemas.microsoft.com/office/drawing/2010/main" xmlns="" w="9525">
                   <a:solidFill>
                     <a:srgbClr val="000000"/>
                   </a:solidFill>
@@ -4436,7 +4436,7 @@
             </a:ln>
             <a:extLst>
               <a:ext uri="{91240B29-F687-4f45-9708-019B960494DF}">
-                <a14:hiddenLine xmlns="" xmlns:a14="http://schemas.microsoft.com/office/drawing/2010/main" w="9525">
+                <a14:hiddenLine xmlns:a14="http://schemas.microsoft.com/office/drawing/2010/main" xmlns="" w="9525">
                   <a:solidFill>
                     <a:srgbClr val="000000"/>
                   </a:solidFill>
@@ -4556,7 +4556,7 @@
             </a:ln>
             <a:extLst>
               <a:ext uri="{91240B29-F687-4f45-9708-019B960494DF}">
-                <a14:hiddenLine xmlns="" xmlns:a14="http://schemas.microsoft.com/office/drawing/2010/main" w="9525">
+                <a14:hiddenLine xmlns:a14="http://schemas.microsoft.com/office/drawing/2010/main" xmlns="" w="9525">
                   <a:solidFill>
                     <a:srgbClr val="000000"/>
                   </a:solidFill>
@@ -4624,7 +4624,7 @@
             </a:ln>
             <a:extLst>
               <a:ext uri="{91240B29-F687-4f45-9708-019B960494DF}">
-                <a14:hiddenLine xmlns="" xmlns:a14="http://schemas.microsoft.com/office/drawing/2010/main" w="9525">
+                <a14:hiddenLine xmlns:a14="http://schemas.microsoft.com/office/drawing/2010/main" xmlns="" w="9525">
                   <a:solidFill>
                     <a:srgbClr val="000000"/>
                   </a:solidFill>
@@ -4714,7 +4714,7 @@
             </a:ln>
             <a:extLst>
               <a:ext uri="{91240B29-F687-4f45-9708-019B960494DF}">
-                <a14:hiddenLine xmlns="" xmlns:a14="http://schemas.microsoft.com/office/drawing/2010/main" w="9525">
+                <a14:hiddenLine xmlns:a14="http://schemas.microsoft.com/office/drawing/2010/main" xmlns="" w="9525">
                   <a:solidFill>
                     <a:srgbClr val="000000"/>
                   </a:solidFill>
@@ -4854,7 +4854,7 @@
           <a:p>
             <a:fld id="{EC4347D3-4C9A-C240-8F14-750059DFEEB0}" type="datetimeFigureOut">
               <a:rPr lang="en-US" smtClean="0"/>
-              <a:t>1/12/26</a:t>
+              <a:t>1/13/26</a:t>
             </a:fld>
             <a:endParaRPr lang="en-US"/>
           </a:p>
@@ -5121,7 +5121,7 @@
           <a:p>
             <a:fld id="{EC4347D3-4C9A-C240-8F14-750059DFEEB0}" type="datetimeFigureOut">
               <a:rPr lang="en-US" smtClean="0"/>
-              <a:t>1/12/26</a:t>
+              <a:t>1/13/26</a:t>
             </a:fld>
             <a:endParaRPr lang="en-US"/>
           </a:p>
@@ -5317,7 +5317,7 @@
           <a:p>
             <a:fld id="{EC4347D3-4C9A-C240-8F14-750059DFEEB0}" type="datetimeFigureOut">
               <a:rPr lang="en-US" smtClean="0"/>
-              <a:t>1/12/26</a:t>
+              <a:t>1/13/26</a:t>
             </a:fld>
             <a:endParaRPr lang="en-US"/>
           </a:p>
@@ -5580,7 +5580,7 @@
           <a:p>
             <a:fld id="{EC4347D3-4C9A-C240-8F14-750059DFEEB0}" type="datetimeFigureOut">
               <a:rPr lang="en-US" smtClean="0"/>
-              <a:t>1/12/26</a:t>
+              <a:t>1/13/26</a:t>
             </a:fld>
             <a:endParaRPr lang="en-US"/>
           </a:p>
@@ -6014,7 +6014,7 @@
           <a:p>
             <a:fld id="{EC4347D3-4C9A-C240-8F14-750059DFEEB0}" type="datetimeFigureOut">
               <a:rPr lang="en-US" smtClean="0"/>
-              <a:t>1/12/26</a:t>
+              <a:t>1/13/26</a:t>
             </a:fld>
             <a:endParaRPr lang="en-US"/>
           </a:p>
@@ -6560,7 +6560,7 @@
           <a:p>
             <a:fld id="{EC4347D3-4C9A-C240-8F14-750059DFEEB0}" type="datetimeFigureOut">
               <a:rPr lang="en-US" smtClean="0"/>
-              <a:t>1/12/26</a:t>
+              <a:t>1/13/26</a:t>
             </a:fld>
             <a:endParaRPr lang="en-US"/>
           </a:p>
@@ -7280,7 +7280,7 @@
           <a:p>
             <a:fld id="{EC4347D3-4C9A-C240-8F14-750059DFEEB0}" type="datetimeFigureOut">
               <a:rPr lang="en-US" smtClean="0"/>
-              <a:t>1/12/26</a:t>
+              <a:t>1/13/26</a:t>
             </a:fld>
             <a:endParaRPr lang="en-US"/>
           </a:p>
@@ -7450,7 +7450,7 @@
           <a:p>
             <a:fld id="{EC4347D3-4C9A-C240-8F14-750059DFEEB0}" type="datetimeFigureOut">
               <a:rPr lang="en-US" smtClean="0"/>
-              <a:t>1/12/26</a:t>
+              <a:t>1/13/26</a:t>
             </a:fld>
             <a:endParaRPr lang="en-US"/>
           </a:p>
@@ -7630,7 +7630,7 @@
           <a:p>
             <a:fld id="{EC4347D3-4C9A-C240-8F14-750059DFEEB0}" type="datetimeFigureOut">
               <a:rPr lang="en-US" smtClean="0"/>
-              <a:t>1/12/26</a:t>
+              <a:t>1/13/26</a:t>
             </a:fld>
             <a:endParaRPr lang="en-US"/>
           </a:p>
@@ -7800,7 +7800,7 @@
           <a:p>
             <a:fld id="{EC4347D3-4C9A-C240-8F14-750059DFEEB0}" type="datetimeFigureOut">
               <a:rPr lang="en-US" smtClean="0"/>
-              <a:t>1/12/26</a:t>
+              <a:t>1/13/26</a:t>
             </a:fld>
             <a:endParaRPr lang="en-US"/>
           </a:p>
@@ -8050,7 +8050,7 @@
           <a:p>
             <a:fld id="{EC4347D3-4C9A-C240-8F14-750059DFEEB0}" type="datetimeFigureOut">
               <a:rPr lang="en-US" smtClean="0"/>
-              <a:t>1/12/26</a:t>
+              <a:t>1/13/26</a:t>
             </a:fld>
             <a:endParaRPr lang="en-US"/>
           </a:p>
@@ -8282,7 +8282,7 @@
           <a:p>
             <a:fld id="{EC4347D3-4C9A-C240-8F14-750059DFEEB0}" type="datetimeFigureOut">
               <a:rPr lang="en-US" smtClean="0"/>
-              <a:t>1/12/26</a:t>
+              <a:t>1/13/26</a:t>
             </a:fld>
             <a:endParaRPr lang="en-US"/>
           </a:p>
@@ -8668,7 +8668,7 @@
           <a:p>
             <a:fld id="{EC4347D3-4C9A-C240-8F14-750059DFEEB0}" type="datetimeFigureOut">
               <a:rPr lang="en-US" smtClean="0"/>
-              <a:t>1/12/26</a:t>
+              <a:t>1/13/26</a:t>
             </a:fld>
             <a:endParaRPr lang="en-US"/>
           </a:p>
@@ -8791,7 +8791,7 @@
           <a:p>
             <a:fld id="{EC4347D3-4C9A-C240-8F14-750059DFEEB0}" type="datetimeFigureOut">
               <a:rPr lang="en-US" smtClean="0"/>
-              <a:t>1/12/26</a:t>
+              <a:t>1/13/26</a:t>
             </a:fld>
             <a:endParaRPr lang="en-US"/>
           </a:p>
@@ -8886,7 +8886,7 @@
           <a:p>
             <a:fld id="{EC4347D3-4C9A-C240-8F14-750059DFEEB0}" type="datetimeFigureOut">
               <a:rPr lang="en-US" smtClean="0"/>
-              <a:t>1/12/26</a:t>
+              <a:t>1/13/26</a:t>
             </a:fld>
             <a:endParaRPr lang="en-US"/>
           </a:p>
@@ -9135,7 +9135,7 @@
           <a:p>
             <a:fld id="{EC4347D3-4C9A-C240-8F14-750059DFEEB0}" type="datetimeFigureOut">
               <a:rPr lang="en-US" smtClean="0"/>
-              <a:t>1/12/26</a:t>
+              <a:t>1/13/26</a:t>
             </a:fld>
             <a:endParaRPr lang="en-US"/>
           </a:p>
@@ -9420,7 +9420,7 @@
           <a:p>
             <a:fld id="{EC4347D3-4C9A-C240-8F14-750059DFEEB0}" type="datetimeFigureOut">
               <a:rPr lang="en-US" smtClean="0"/>
-              <a:t>1/12/26</a:t>
+              <a:t>1/13/26</a:t>
             </a:fld>
             <a:endParaRPr lang="en-US"/>
           </a:p>
@@ -9543,7 +9543,7 @@
           <a:noFill/>
           <a:extLst>
             <a:ext uri="{909E8E84-426E-40dd-AFC4-6F175D3DCCD1}">
-              <a14:hiddenFill xmlns="" xmlns:a14="http://schemas.microsoft.com/office/drawing/2010/main">
+              <a14:hiddenFill xmlns:a14="http://schemas.microsoft.com/office/drawing/2010/main" xmlns="">
                 <a:solidFill>
                   <a:srgbClr val="FFFFFF"/>
                 </a:solidFill>
@@ -9617,7 +9617,7 @@
               </a:ln>
               <a:extLst>
                 <a:ext uri="{91240B29-F687-4f45-9708-019B960494DF}">
-                  <a14:hiddenLine xmlns="" xmlns:a14="http://schemas.microsoft.com/office/drawing/2010/main" w="9525">
+                  <a14:hiddenLine xmlns:a14="http://schemas.microsoft.com/office/drawing/2010/main" xmlns="" w="9525">
                     <a:solidFill>
                       <a:srgbClr val="000000"/>
                     </a:solidFill>
@@ -9707,7 +9707,7 @@
               </a:ln>
               <a:extLst>
                 <a:ext uri="{91240B29-F687-4f45-9708-019B960494DF}">
-                  <a14:hiddenLine xmlns="" xmlns:a14="http://schemas.microsoft.com/office/drawing/2010/main" w="9525">
+                  <a14:hiddenLine xmlns:a14="http://schemas.microsoft.com/office/drawing/2010/main" xmlns="" w="9525">
                     <a:solidFill>
                       <a:srgbClr val="000000"/>
                     </a:solidFill>
@@ -9797,7 +9797,7 @@
               </a:ln>
               <a:extLst>
                 <a:ext uri="{91240B29-F687-4f45-9708-019B960494DF}">
-                  <a14:hiddenLine xmlns="" xmlns:a14="http://schemas.microsoft.com/office/drawing/2010/main" w="9525">
+                  <a14:hiddenLine xmlns:a14="http://schemas.microsoft.com/office/drawing/2010/main" xmlns="" w="9525">
                     <a:solidFill>
                       <a:srgbClr val="000000"/>
                     </a:solidFill>
@@ -9859,7 +9859,7 @@
               </a:ln>
               <a:extLst>
                 <a:ext uri="{91240B29-F687-4f45-9708-019B960494DF}">
-                  <a14:hiddenLine xmlns="" xmlns:a14="http://schemas.microsoft.com/office/drawing/2010/main" w="9525">
+                  <a14:hiddenLine xmlns:a14="http://schemas.microsoft.com/office/drawing/2010/main" xmlns="" w="9525">
                     <a:solidFill>
                       <a:srgbClr val="000000"/>
                     </a:solidFill>
@@ -9949,7 +9949,7 @@
               </a:ln>
               <a:extLst>
                 <a:ext uri="{91240B29-F687-4f45-9708-019B960494DF}">
-                  <a14:hiddenLine xmlns="" xmlns:a14="http://schemas.microsoft.com/office/drawing/2010/main" w="9525">
+                  <a14:hiddenLine xmlns:a14="http://schemas.microsoft.com/office/drawing/2010/main" xmlns="" w="9525">
                     <a:solidFill>
                       <a:srgbClr val="000000"/>
                     </a:solidFill>
@@ -10011,7 +10011,7 @@
               </a:ln>
               <a:extLst>
                 <a:ext uri="{91240B29-F687-4f45-9708-019B960494DF}">
-                  <a14:hiddenLine xmlns="" xmlns:a14="http://schemas.microsoft.com/office/drawing/2010/main" w="9525">
+                  <a14:hiddenLine xmlns:a14="http://schemas.microsoft.com/office/drawing/2010/main" xmlns="" w="9525">
                     <a:solidFill>
                       <a:srgbClr val="000000"/>
                     </a:solidFill>
@@ -10073,7 +10073,7 @@
               </a:ln>
               <a:extLst>
                 <a:ext uri="{91240B29-F687-4f45-9708-019B960494DF}">
-                  <a14:hiddenLine xmlns="" xmlns:a14="http://schemas.microsoft.com/office/drawing/2010/main" w="9525">
+                  <a14:hiddenLine xmlns:a14="http://schemas.microsoft.com/office/drawing/2010/main" xmlns="" w="9525">
                     <a:solidFill>
                       <a:srgbClr val="000000"/>
                     </a:solidFill>
@@ -10163,7 +10163,7 @@
               </a:ln>
               <a:extLst>
                 <a:ext uri="{91240B29-F687-4f45-9708-019B960494DF}">
-                  <a14:hiddenLine xmlns="" xmlns:a14="http://schemas.microsoft.com/office/drawing/2010/main" w="9525">
+                  <a14:hiddenLine xmlns:a14="http://schemas.microsoft.com/office/drawing/2010/main" xmlns="" w="9525">
                     <a:solidFill>
                       <a:srgbClr val="000000"/>
                     </a:solidFill>
@@ -10253,7 +10253,7 @@
               </a:ln>
               <a:extLst>
                 <a:ext uri="{91240B29-F687-4f45-9708-019B960494DF}">
-                  <a14:hiddenLine xmlns="" xmlns:a14="http://schemas.microsoft.com/office/drawing/2010/main" w="9525">
+                  <a14:hiddenLine xmlns:a14="http://schemas.microsoft.com/office/drawing/2010/main" xmlns="" w="9525">
                     <a:solidFill>
                       <a:srgbClr val="000000"/>
                     </a:solidFill>
@@ -10315,7 +10315,7 @@
               </a:ln>
               <a:extLst>
                 <a:ext uri="{91240B29-F687-4f45-9708-019B960494DF}">
-                  <a14:hiddenLine xmlns="" xmlns:a14="http://schemas.microsoft.com/office/drawing/2010/main" w="9525">
+                  <a14:hiddenLine xmlns:a14="http://schemas.microsoft.com/office/drawing/2010/main" xmlns="" w="9525">
                     <a:solidFill>
                       <a:srgbClr val="000000"/>
                     </a:solidFill>
@@ -10425,7 +10425,7 @@
               </a:ln>
               <a:extLst>
                 <a:ext uri="{91240B29-F687-4f45-9708-019B960494DF}">
-                  <a14:hiddenLine xmlns="" xmlns:a14="http://schemas.microsoft.com/office/drawing/2010/main" w="9525">
+                  <a14:hiddenLine xmlns:a14="http://schemas.microsoft.com/office/drawing/2010/main" xmlns="" w="9525">
                     <a:solidFill>
                       <a:srgbClr val="000000"/>
                     </a:solidFill>
@@ -10509,7 +10509,7 @@
               </a:ln>
               <a:extLst>
                 <a:ext uri="{91240B29-F687-4f45-9708-019B960494DF}">
-                  <a14:hiddenLine xmlns="" xmlns:a14="http://schemas.microsoft.com/office/drawing/2010/main" w="9525">
+                  <a14:hiddenLine xmlns:a14="http://schemas.microsoft.com/office/drawing/2010/main" xmlns="" w="9525">
                     <a:solidFill>
                       <a:srgbClr val="000000"/>
                     </a:solidFill>
@@ -10571,7 +10571,7 @@
               </a:ln>
               <a:extLst>
                 <a:ext uri="{91240B29-F687-4f45-9708-019B960494DF}">
-                  <a14:hiddenLine xmlns="" xmlns:a14="http://schemas.microsoft.com/office/drawing/2010/main" w="9525">
+                  <a14:hiddenLine xmlns:a14="http://schemas.microsoft.com/office/drawing/2010/main" xmlns="" w="9525">
                     <a:solidFill>
                       <a:srgbClr val="000000"/>
                     </a:solidFill>
@@ -10633,7 +10633,7 @@
               </a:ln>
               <a:extLst>
                 <a:ext uri="{91240B29-F687-4f45-9708-019B960494DF}">
-                  <a14:hiddenLine xmlns="" xmlns:a14="http://schemas.microsoft.com/office/drawing/2010/main" w="9525">
+                  <a14:hiddenLine xmlns:a14="http://schemas.microsoft.com/office/drawing/2010/main" xmlns="" w="9525">
                     <a:solidFill>
                       <a:srgbClr val="000000"/>
                     </a:solidFill>
@@ -10723,7 +10723,7 @@
               </a:ln>
               <a:extLst>
                 <a:ext uri="{91240B29-F687-4f45-9708-019B960494DF}">
-                  <a14:hiddenLine xmlns="" xmlns:a14="http://schemas.microsoft.com/office/drawing/2010/main" w="9525">
+                  <a14:hiddenLine xmlns:a14="http://schemas.microsoft.com/office/drawing/2010/main" xmlns="" w="9525">
                     <a:solidFill>
                       <a:srgbClr val="000000"/>
                     </a:solidFill>
@@ -10757,7 +10757,7 @@
               </a:ln>
               <a:extLst>
                 <a:ext uri="{91240B29-F687-4f45-9708-019B960494DF}">
-                  <a14:hiddenLine xmlns="" xmlns:a14="http://schemas.microsoft.com/office/drawing/2010/main" w="9525">
+                  <a14:hiddenLine xmlns:a14="http://schemas.microsoft.com/office/drawing/2010/main" xmlns="" w="9525">
                     <a:solidFill>
                       <a:srgbClr val="000000"/>
                     </a:solidFill>
@@ -10822,7 +10822,7 @@
               </a:ln>
               <a:extLst>
                 <a:ext uri="{91240B29-F687-4f45-9708-019B960494DF}">
-                  <a14:hiddenLine xmlns="" xmlns:a14="http://schemas.microsoft.com/office/drawing/2010/main" w="9525">
+                  <a14:hiddenLine xmlns:a14="http://schemas.microsoft.com/office/drawing/2010/main" xmlns="" w="9525">
                     <a:solidFill>
                       <a:srgbClr val="000000"/>
                     </a:solidFill>
@@ -10912,7 +10912,7 @@
               </a:ln>
               <a:extLst>
                 <a:ext uri="{91240B29-F687-4f45-9708-019B960494DF}">
-                  <a14:hiddenLine xmlns="" xmlns:a14="http://schemas.microsoft.com/office/drawing/2010/main" w="9525">
+                  <a14:hiddenLine xmlns:a14="http://schemas.microsoft.com/office/drawing/2010/main" xmlns="" w="9525">
                     <a:solidFill>
                       <a:srgbClr val="000000"/>
                     </a:solidFill>
@@ -10974,7 +10974,7 @@
               </a:ln>
               <a:extLst>
                 <a:ext uri="{91240B29-F687-4f45-9708-019B960494DF}">
-                  <a14:hiddenLine xmlns="" xmlns:a14="http://schemas.microsoft.com/office/drawing/2010/main" w="9525">
+                  <a14:hiddenLine xmlns:a14="http://schemas.microsoft.com/office/drawing/2010/main" xmlns="" w="9525">
                     <a:solidFill>
                       <a:srgbClr val="000000"/>
                     </a:solidFill>
@@ -11064,7 +11064,7 @@
               </a:ln>
               <a:extLst>
                 <a:ext uri="{91240B29-F687-4f45-9708-019B960494DF}">
-                  <a14:hiddenLine xmlns="" xmlns:a14="http://schemas.microsoft.com/office/drawing/2010/main" w="9525">
+                  <a14:hiddenLine xmlns:a14="http://schemas.microsoft.com/office/drawing/2010/main" xmlns="" w="9525">
                     <a:solidFill>
                       <a:srgbClr val="000000"/>
                     </a:solidFill>
@@ -11129,7 +11129,7 @@
               </a:ln>
               <a:extLst>
                 <a:ext uri="{91240B29-F687-4f45-9708-019B960494DF}">
-                  <a14:hiddenLine xmlns="" xmlns:a14="http://schemas.microsoft.com/office/drawing/2010/main" w="9525">
+                  <a14:hiddenLine xmlns:a14="http://schemas.microsoft.com/office/drawing/2010/main" xmlns="" w="9525">
                     <a:solidFill>
                       <a:srgbClr val="000000"/>
                     </a:solidFill>
@@ -11191,7 +11191,7 @@
               </a:ln>
               <a:extLst>
                 <a:ext uri="{91240B29-F687-4f45-9708-019B960494DF}">
-                  <a14:hiddenLine xmlns="" xmlns:a14="http://schemas.microsoft.com/office/drawing/2010/main" w="9525">
+                  <a14:hiddenLine xmlns:a14="http://schemas.microsoft.com/office/drawing/2010/main" xmlns="" w="9525">
                     <a:solidFill>
                       <a:srgbClr val="000000"/>
                     </a:solidFill>
@@ -11281,7 +11281,7 @@
               </a:ln>
               <a:extLst>
                 <a:ext uri="{91240B29-F687-4f45-9708-019B960494DF}">
-                  <a14:hiddenLine xmlns="" xmlns:a14="http://schemas.microsoft.com/office/drawing/2010/main" w="9525">
+                  <a14:hiddenLine xmlns:a14="http://schemas.microsoft.com/office/drawing/2010/main" xmlns="" w="9525">
                     <a:solidFill>
                       <a:srgbClr val="000000"/>
                     </a:solidFill>
@@ -11371,7 +11371,7 @@
               </a:ln>
               <a:extLst>
                 <a:ext uri="{91240B29-F687-4f45-9708-019B960494DF}">
-                  <a14:hiddenLine xmlns="" xmlns:a14="http://schemas.microsoft.com/office/drawing/2010/main" w="9525">
+                  <a14:hiddenLine xmlns:a14="http://schemas.microsoft.com/office/drawing/2010/main" xmlns="" w="9525">
                     <a:solidFill>
                       <a:srgbClr val="000000"/>
                     </a:solidFill>
@@ -11436,7 +11436,7 @@
               </a:ln>
               <a:extLst>
                 <a:ext uri="{91240B29-F687-4f45-9708-019B960494DF}">
-                  <a14:hiddenLine xmlns="" xmlns:a14="http://schemas.microsoft.com/office/drawing/2010/main" w="9525">
+                  <a14:hiddenLine xmlns:a14="http://schemas.microsoft.com/office/drawing/2010/main" xmlns="" w="9525">
                     <a:solidFill>
                       <a:srgbClr val="000000"/>
                     </a:solidFill>
@@ -11556,7 +11556,7 @@
               </a:ln>
               <a:extLst>
                 <a:ext uri="{91240B29-F687-4f45-9708-019B960494DF}">
-                  <a14:hiddenLine xmlns="" xmlns:a14="http://schemas.microsoft.com/office/drawing/2010/main" w="9525">
+                  <a14:hiddenLine xmlns:a14="http://schemas.microsoft.com/office/drawing/2010/main" xmlns="" w="9525">
                     <a:solidFill>
                       <a:srgbClr val="000000"/>
                     </a:solidFill>
@@ -11637,7 +11637,7 @@
               </a:ln>
               <a:extLst>
                 <a:ext uri="{91240B29-F687-4f45-9708-019B960494DF}">
-                  <a14:hiddenLine xmlns="" xmlns:a14="http://schemas.microsoft.com/office/drawing/2010/main" w="9525">
+                  <a14:hiddenLine xmlns:a14="http://schemas.microsoft.com/office/drawing/2010/main" xmlns="" w="9525">
                     <a:solidFill>
                       <a:srgbClr val="000000"/>
                     </a:solidFill>
@@ -11752,7 +11752,7 @@
               </a:ln>
               <a:extLst>
                 <a:ext uri="{91240B29-F687-4f45-9708-019B960494DF}">
-                  <a14:hiddenLine xmlns="" xmlns:a14="http://schemas.microsoft.com/office/drawing/2010/main" w="9525">
+                  <a14:hiddenLine xmlns:a14="http://schemas.microsoft.com/office/drawing/2010/main" xmlns="" w="9525">
                     <a:solidFill>
                       <a:srgbClr val="000000"/>
                     </a:solidFill>
@@ -11842,7 +11842,7 @@
               </a:ln>
               <a:extLst>
                 <a:ext uri="{91240B29-F687-4f45-9708-019B960494DF}">
-                  <a14:hiddenLine xmlns="" xmlns:a14="http://schemas.microsoft.com/office/drawing/2010/main" w="9525">
+                  <a14:hiddenLine xmlns:a14="http://schemas.microsoft.com/office/drawing/2010/main" xmlns="" w="9525">
                     <a:solidFill>
                       <a:srgbClr val="000000"/>
                     </a:solidFill>
@@ -11907,7 +11907,7 @@
               </a:ln>
               <a:extLst>
                 <a:ext uri="{91240B29-F687-4f45-9708-019B960494DF}">
-                  <a14:hiddenLine xmlns="" xmlns:a14="http://schemas.microsoft.com/office/drawing/2010/main" w="9525">
+                  <a14:hiddenLine xmlns:a14="http://schemas.microsoft.com/office/drawing/2010/main" xmlns="" w="9525">
                     <a:solidFill>
                       <a:srgbClr val="000000"/>
                     </a:solidFill>
@@ -11997,7 +11997,7 @@
               </a:ln>
               <a:extLst>
                 <a:ext uri="{91240B29-F687-4f45-9708-019B960494DF}">
-                  <a14:hiddenLine xmlns="" xmlns:a14="http://schemas.microsoft.com/office/drawing/2010/main" w="9525">
+                  <a14:hiddenLine xmlns:a14="http://schemas.microsoft.com/office/drawing/2010/main" xmlns="" w="9525">
                     <a:solidFill>
                       <a:srgbClr val="000000"/>
                     </a:solidFill>
@@ -12065,7 +12065,7 @@
               </a:ln>
               <a:extLst>
                 <a:ext uri="{91240B29-F687-4f45-9708-019B960494DF}">
-                  <a14:hiddenLine xmlns="" xmlns:a14="http://schemas.microsoft.com/office/drawing/2010/main" w="9525">
+                  <a14:hiddenLine xmlns:a14="http://schemas.microsoft.com/office/drawing/2010/main" xmlns="" w="9525">
                     <a:solidFill>
                       <a:srgbClr val="000000"/>
                     </a:solidFill>
@@ -12155,7 +12155,7 @@
               </a:ln>
               <a:extLst>
                 <a:ext uri="{91240B29-F687-4f45-9708-019B960494DF}">
-                  <a14:hiddenLine xmlns="" xmlns:a14="http://schemas.microsoft.com/office/drawing/2010/main" w="9525">
+                  <a14:hiddenLine xmlns:a14="http://schemas.microsoft.com/office/drawing/2010/main" xmlns="" w="9525">
                     <a:solidFill>
                       <a:srgbClr val="000000"/>
                     </a:solidFill>
@@ -12223,7 +12223,7 @@
               </a:ln>
               <a:extLst>
                 <a:ext uri="{91240B29-F687-4f45-9708-019B960494DF}">
-                  <a14:hiddenLine xmlns="" xmlns:a14="http://schemas.microsoft.com/office/drawing/2010/main" w="9525">
+                  <a14:hiddenLine xmlns:a14="http://schemas.microsoft.com/office/drawing/2010/main" xmlns="" w="9525">
                     <a:solidFill>
                       <a:srgbClr val="000000"/>
                     </a:solidFill>
@@ -12313,7 +12313,7 @@
               </a:ln>
               <a:extLst>
                 <a:ext uri="{91240B29-F687-4f45-9708-019B960494DF}">
-                  <a14:hiddenLine xmlns="" xmlns:a14="http://schemas.microsoft.com/office/drawing/2010/main" w="9525">
+                  <a14:hiddenLine xmlns:a14="http://schemas.microsoft.com/office/drawing/2010/main" xmlns="" w="9525">
                     <a:solidFill>
                       <a:srgbClr val="000000"/>
                     </a:solidFill>
@@ -12347,7 +12347,7 @@
               </a:ln>
               <a:extLst>
                 <a:ext uri="{91240B29-F687-4f45-9708-019B960494DF}">
-                  <a14:hiddenLine xmlns="" xmlns:a14="http://schemas.microsoft.com/office/drawing/2010/main" w="9525">
+                  <a14:hiddenLine xmlns:a14="http://schemas.microsoft.com/office/drawing/2010/main" xmlns="" w="9525">
                     <a:solidFill>
                       <a:srgbClr val="000000"/>
                     </a:solidFill>
@@ -12487,7 +12487,7 @@
           <a:p>
             <a:fld id="{EC4347D3-4C9A-C240-8F14-750059DFEEB0}" type="datetimeFigureOut">
               <a:rPr lang="en-US" smtClean="0"/>
-              <a:t>1/12/26</a:t>
+              <a:t>1/13/26</a:t>
             </a:fld>
             <a:endParaRPr lang="en-US"/>
           </a:p>
@@ -15610,14 +15610,18 @@
             <a:pPr lvl="1"/>
             <a:r>
               <a:rPr lang="en-US" sz="2000" dirty="0"/>
-              <a:t>Fri., Mar. 12			Topics 1-3 from previous slide</a:t>
+              <a:t>Thu., Mar. 12			Topics 1-3 from previous slide</a:t>
             </a:r>
           </a:p>
           <a:p>
             <a:pPr lvl="1"/>
             <a:r>
+              <a:rPr lang="en-US" dirty="0"/>
+              <a:t>Thu</a:t>
+            </a:r>
+            <a:r>
               <a:rPr lang="en-US" sz="2000" dirty="0"/>
-              <a:t>Fri., Apr. 16			</a:t>
+              <a:t>., Apr. 16			</a:t>
             </a:r>
             <a:r>
               <a:rPr lang="en-US" dirty="0"/>

</xml_diff>